<commit_message>
slides2w insert sat examples
</commit_message>
<xml_diff>
--- a/fall11/slidesF11/slides2w.pptx
+++ b/fall11/slidesF11/slides2w.pptx
@@ -6,10 +6,10 @@
     <p:sldMasterId id="2147483651" r:id="rId2"/>
   </p:sldMasterIdLst>
   <p:notesMasterIdLst>
-    <p:notesMasterId r:id="rId48"/>
+    <p:notesMasterId r:id="rId49"/>
   </p:notesMasterIdLst>
   <p:handoutMasterIdLst>
-    <p:handoutMasterId r:id="rId49"/>
+    <p:handoutMasterId r:id="rId50"/>
   </p:handoutMasterIdLst>
   <p:sldIdLst>
     <p:sldId id="392" r:id="rId3"/>
@@ -36,32 +36,33 @@
     <p:sldId id="438" r:id="rId24"/>
     <p:sldId id="434" r:id="rId25"/>
     <p:sldId id="443" r:id="rId26"/>
-    <p:sldId id="446" r:id="rId27"/>
-    <p:sldId id="460" r:id="rId28"/>
-    <p:sldId id="445" r:id="rId29"/>
-    <p:sldId id="444" r:id="rId30"/>
-    <p:sldId id="412" r:id="rId31"/>
-    <p:sldId id="458" r:id="rId32"/>
-    <p:sldId id="459" r:id="rId33"/>
-    <p:sldId id="447" r:id="rId34"/>
-    <p:sldId id="448" r:id="rId35"/>
-    <p:sldId id="449" r:id="rId36"/>
-    <p:sldId id="450" r:id="rId37"/>
-    <p:sldId id="451" r:id="rId38"/>
-    <p:sldId id="452" r:id="rId39"/>
-    <p:sldId id="453" r:id="rId40"/>
-    <p:sldId id="454" r:id="rId41"/>
-    <p:sldId id="455" r:id="rId42"/>
-    <p:sldId id="430" r:id="rId43"/>
-    <p:sldId id="431" r:id="rId44"/>
-    <p:sldId id="432" r:id="rId45"/>
-    <p:sldId id="433" r:id="rId46"/>
-    <p:sldId id="427" r:id="rId47"/>
+    <p:sldId id="464" r:id="rId27"/>
+    <p:sldId id="445" r:id="rId28"/>
+    <p:sldId id="444" r:id="rId29"/>
+    <p:sldId id="446" r:id="rId30"/>
+    <p:sldId id="460" r:id="rId31"/>
+    <p:sldId id="412" r:id="rId32"/>
+    <p:sldId id="458" r:id="rId33"/>
+    <p:sldId id="459" r:id="rId34"/>
+    <p:sldId id="447" r:id="rId35"/>
+    <p:sldId id="448" r:id="rId36"/>
+    <p:sldId id="449" r:id="rId37"/>
+    <p:sldId id="450" r:id="rId38"/>
+    <p:sldId id="451" r:id="rId39"/>
+    <p:sldId id="452" r:id="rId40"/>
+    <p:sldId id="453" r:id="rId41"/>
+    <p:sldId id="454" r:id="rId42"/>
+    <p:sldId id="455" r:id="rId43"/>
+    <p:sldId id="430" r:id="rId44"/>
+    <p:sldId id="431" r:id="rId45"/>
+    <p:sldId id="432" r:id="rId46"/>
+    <p:sldId id="433" r:id="rId47"/>
+    <p:sldId id="427" r:id="rId48"/>
   </p:sldIdLst>
   <p:sldSz cx="9144000" cy="6858000" type="screen4x3"/>
   <p:notesSz cx="7315200" cy="9601200"/>
   <p:custDataLst>
-    <p:tags r:id="rId51"/>
+    <p:tags r:id="rId52"/>
   </p:custDataLst>
   <p:defaultTextStyle>
     <a:defPPr>
@@ -2881,7 +2882,7 @@
             <a:fld id="{A02B9F3F-3042-489F-AF35-1A733968F079}" type="slidenum">
               <a:rPr lang="en-US" smtClean="0"/>
               <a:pPr/>
-              <a:t>32</a:t>
+              <a:t>30</a:t>
             </a:fld>
             <a:endParaRPr lang="en-US"/>
           </a:p>
@@ -2963,7 +2964,7 @@
             <a:fld id="{A02B9F3F-3042-489F-AF35-1A733968F079}" type="slidenum">
               <a:rPr lang="en-US" smtClean="0"/>
               <a:pPr/>
-              <a:t>39</a:t>
+              <a:t>33</a:t>
             </a:fld>
             <a:endParaRPr lang="en-US"/>
           </a:p>
@@ -3406,6 +3407,88 @@
       </p:grpSpPr>
       <p:sp>
         <p:nvSpPr>
+          <p:cNvPr id="2" name="Slide Image Placeholder 1"/>
+          <p:cNvSpPr>
+            <a:spLocks noGrp="1" noRot="1" noChangeAspect="1"/>
+          </p:cNvSpPr>
+          <p:nvPr>
+            <p:ph type="sldImg"/>
+          </p:nvPr>
+        </p:nvSpPr>
+        <p:spPr/>
+      </p:sp>
+      <p:sp>
+        <p:nvSpPr>
+          <p:cNvPr id="3" name="Notes Placeholder 2"/>
+          <p:cNvSpPr>
+            <a:spLocks noGrp="1"/>
+          </p:cNvSpPr>
+          <p:nvPr>
+            <p:ph type="body" idx="1"/>
+          </p:nvPr>
+        </p:nvSpPr>
+        <p:spPr/>
+        <p:txBody>
+          <a:bodyPr>
+            <a:normAutofit/>
+          </a:bodyPr>
+          <a:lstStyle/>
+          <a:p>
+            <a:endParaRPr lang="en-US"/>
+          </a:p>
+        </p:txBody>
+      </p:sp>
+      <p:sp>
+        <p:nvSpPr>
+          <p:cNvPr id="4" name="Slide Number Placeholder 3"/>
+          <p:cNvSpPr>
+            <a:spLocks noGrp="1"/>
+          </p:cNvSpPr>
+          <p:nvPr>
+            <p:ph type="sldNum" sz="quarter" idx="10"/>
+          </p:nvPr>
+        </p:nvSpPr>
+        <p:spPr/>
+        <p:txBody>
+          <a:bodyPr/>
+          <a:lstStyle/>
+          <a:p>
+            <a:fld id="{A02B9F3F-3042-489F-AF35-1A733968F079}" type="slidenum">
+              <a:rPr lang="en-US" smtClean="0"/>
+              <a:pPr/>
+              <a:t>45</a:t>
+            </a:fld>
+            <a:endParaRPr lang="en-US"/>
+          </a:p>
+        </p:txBody>
+      </p:sp>
+    </p:spTree>
+  </p:cSld>
+  <p:clrMapOvr>
+    <a:masterClrMapping/>
+  </p:clrMapOvr>
+</p:notes>
+</file>
+
+<file path=ppt/notesSlides/notesSlide38.xml><?xml version="1.0" encoding="utf-8"?>
+<p:notes xmlns:a="http://schemas.openxmlformats.org/drawingml/2006/main" xmlns:r="http://schemas.openxmlformats.org/officeDocument/2006/relationships" xmlns:p="http://schemas.openxmlformats.org/presentationml/2006/main">
+  <p:cSld>
+    <p:spTree>
+      <p:nvGrpSpPr>
+        <p:cNvPr id="1" name=""/>
+        <p:cNvGrpSpPr/>
+        <p:nvPr/>
+      </p:nvGrpSpPr>
+      <p:grpSpPr>
+        <a:xfrm>
+          <a:off x="0" y="0"/>
+          <a:ext cx="0" cy="0"/>
+          <a:chOff x="0" y="0"/>
+          <a:chExt cx="0" cy="0"/>
+        </a:xfrm>
+      </p:grpSpPr>
+      <p:sp>
+        <p:nvSpPr>
           <p:cNvPr id="72706" name="Rectangle 7"/>
           <p:cNvSpPr>
             <a:spLocks noGrp="1" noChangeArrowheads="1"/>
@@ -3424,7 +3507,7 @@
             <a:fld id="{6653F924-F418-411E-8C35-24F3766CE997}" type="slidenum">
               <a:rPr lang="en-US" smtClean="0"/>
               <a:pPr/>
-              <a:t>45</a:t>
+              <a:t>46</a:t>
             </a:fld>
             <a:endParaRPr lang="en-US" smtClean="0"/>
           </a:p>
@@ -11223,7 +11306,7 @@
           <a:graphicData uri="http://schemas.openxmlformats.org/presentationml/2006/ole">
             <mc:AlternateContent xmlns:mc="http://schemas.openxmlformats.org/markup-compatibility/2006">
               <mc:Choice xmlns:v="urn:schemas-microsoft-com:vml" Requires="v">
-                <p:oleObj spid="_x0000_s250902" name="Equation" r:id="rId4" imgW="152400" imgH="114300" progId="Equation.DSMT4">
+                <p:oleObj spid="_x0000_s250909" name="Equation" r:id="rId4" imgW="152400" imgH="114300" progId="Equation.DSMT4">
                   <p:embed/>
                 </p:oleObj>
               </mc:Choice>
@@ -11293,7 +11376,7 @@
           <a:graphicData uri="http://schemas.openxmlformats.org/presentationml/2006/ole">
             <mc:AlternateContent xmlns:mc="http://schemas.openxmlformats.org/markup-compatibility/2006">
               <mc:Choice xmlns:v="urn:schemas-microsoft-com:vml" Requires="v">
-                <p:oleObj spid="_x0000_s250903" name="Equation" r:id="rId6" imgW="152400" imgH="114300" progId="Equation.DSMT4">
+                <p:oleObj spid="_x0000_s250910" name="Equation" r:id="rId6" imgW="152400" imgH="114300" progId="Equation.DSMT4">
                   <p:embed/>
                 </p:oleObj>
               </mc:Choice>
@@ -15440,7 +15523,7 @@
           <a:graphicData uri="http://schemas.openxmlformats.org/presentationml/2006/ole">
             <mc:AlternateContent xmlns:mc="http://schemas.openxmlformats.org/markup-compatibility/2006">
               <mc:Choice xmlns:v="urn:schemas-microsoft-com:vml" Requires="v">
-                <p:oleObj spid="_x0000_s356397" name="Equation" r:id="rId4" imgW="419040" imgH="253800" progId="Equation.DSMT4">
+                <p:oleObj spid="_x0000_s356410" name="Equation" r:id="rId4" imgW="419040" imgH="253800" progId="Equation.DSMT4">
                   <p:embed/>
                 </p:oleObj>
               </mc:Choice>
@@ -15541,7 +15624,7 @@
           <a:graphicData uri="http://schemas.openxmlformats.org/presentationml/2006/ole">
             <mc:AlternateContent xmlns:mc="http://schemas.openxmlformats.org/markup-compatibility/2006">
               <mc:Choice xmlns:v="urn:schemas-microsoft-com:vml" Requires="v">
-                <p:oleObj spid="_x0000_s356398" name="Equation" r:id="rId6" imgW="419040" imgH="253800" progId="Equation.DSMT4">
+                <p:oleObj spid="_x0000_s356411" name="Equation" r:id="rId6" imgW="419040" imgH="253800" progId="Equation.DSMT4">
                   <p:embed/>
                 </p:oleObj>
               </mc:Choice>
@@ -15611,7 +15694,7 @@
           <a:graphicData uri="http://schemas.openxmlformats.org/presentationml/2006/ole">
             <mc:AlternateContent xmlns:mc="http://schemas.openxmlformats.org/markup-compatibility/2006">
               <mc:Choice xmlns:v="urn:schemas-microsoft-com:vml" Requires="v">
-                <p:oleObj spid="_x0000_s356399" name="Equation" r:id="rId8" imgW="545760" imgH="266400" progId="Equation.DSMT4">
+                <p:oleObj spid="_x0000_s356412" name="Equation" r:id="rId8" imgW="545760" imgH="266400" progId="Equation.DSMT4">
                   <p:embed/>
                 </p:oleObj>
               </mc:Choice>
@@ -16349,7 +16432,7 @@
           <a:graphicData uri="http://schemas.openxmlformats.org/presentationml/2006/ole">
             <mc:AlternateContent xmlns:mc="http://schemas.openxmlformats.org/markup-compatibility/2006">
               <mc:Choice xmlns:v="urn:schemas-microsoft-com:vml" Requires="v">
-                <p:oleObj spid="_x0000_s356400" name="Equation" r:id="rId10" imgW="622300" imgH="215900" progId="Equation.DSMT4">
+                <p:oleObj spid="_x0000_s356413" name="Equation" r:id="rId10" imgW="622300" imgH="215900" progId="Equation.DSMT4">
                   <p:embed/>
                 </p:oleObj>
               </mc:Choice>
@@ -17798,6 +17881,9 @@
               </a:pPr>
               <a:r>
                 <a:rPr lang="en-US" sz="3200" dirty="0">
+                  <a:solidFill>
+                    <a:srgbClr val="0000FF"/>
+                  </a:solidFill>
                   <a:latin typeface="Comic Sans MS" pitchFamily="66" charset="0"/>
                   <a:cs typeface="Arial" charset="0"/>
                 </a:rPr>
@@ -17842,6 +17928,9 @@
               </a:pPr>
               <a:r>
                 <a:rPr lang="en-US" sz="3200" dirty="0">
+                  <a:solidFill>
+                    <a:srgbClr val="0000FF"/>
+                  </a:solidFill>
                   <a:latin typeface="Comic Sans MS" pitchFamily="66" charset="0"/>
                   <a:cs typeface="Arial" charset="0"/>
                 </a:rPr>
@@ -19416,7 +19505,7 @@
           <a:graphicData uri="http://schemas.openxmlformats.org/presentationml/2006/ole">
             <mc:AlternateContent xmlns:mc="http://schemas.openxmlformats.org/markup-compatibility/2006">
               <mc:Choice xmlns:v="urn:schemas-microsoft-com:vml" Requires="v">
-                <p:oleObj spid="_x0000_s402447" name="Equation" r:id="rId4" imgW="850900" imgH="228600" progId="Equation.DSMT4">
+                <p:oleObj spid="_x0000_s402460" name="Equation" r:id="rId4" imgW="850900" imgH="228600" progId="Equation.DSMT4">
                   <p:embed/>
                 </p:oleObj>
               </mc:Choice>
@@ -19478,7 +19567,7 @@
           <a:graphicData uri="http://schemas.openxmlformats.org/presentationml/2006/ole">
             <mc:AlternateContent xmlns:mc="http://schemas.openxmlformats.org/markup-compatibility/2006">
               <mc:Choice xmlns:v="urn:schemas-microsoft-com:vml" Requires="v">
-                <p:oleObj spid="_x0000_s402448" name="Equation" r:id="rId6" imgW="609600" imgH="304800" progId="Equation.DSMT4">
+                <p:oleObj spid="_x0000_s402461" name="Equation" r:id="rId6" imgW="609600" imgH="304800" progId="Equation.DSMT4">
                   <p:embed/>
                 </p:oleObj>
               </mc:Choice>
@@ -19562,7 +19651,7 @@
             <a:graphicData uri="http://schemas.openxmlformats.org/presentationml/2006/ole">
               <mc:AlternateContent xmlns:mc="http://schemas.openxmlformats.org/markup-compatibility/2006">
                 <mc:Choice xmlns:v="urn:schemas-microsoft-com:vml" Requires="v">
-                  <p:oleObj spid="_x0000_s402449" name="Equation" r:id="rId8" imgW="520700" imgH="304800" progId="Equation.DSMT4">
+                  <p:oleObj spid="_x0000_s402462" name="Equation" r:id="rId8" imgW="520700" imgH="304800" progId="Equation.DSMT4">
                     <p:embed/>
                   </p:oleObj>
                 </mc:Choice>
@@ -19642,13 +19731,7 @@
                 <a:rPr lang="en-US" sz="4400" dirty="0" smtClean="0">
                   <a:latin typeface="Comic Sans MS" pitchFamily="66" charset="0"/>
                 </a:rPr>
-                <a:t> </a:t>
-              </a:r>
-              <a:r>
-                <a:rPr lang="en-US" sz="4400" dirty="0" smtClean="0">
-                  <a:latin typeface="Comic Sans MS" pitchFamily="66" charset="0"/>
-                </a:rPr>
-                <a:t>to</a:t>
+                <a:t> to</a:t>
               </a:r>
             </a:p>
           </p:txBody>
@@ -19675,7 +19758,7 @@
             <a:graphicData uri="http://schemas.openxmlformats.org/presentationml/2006/ole">
               <mc:AlternateContent xmlns:mc="http://schemas.openxmlformats.org/markup-compatibility/2006">
                 <mc:Choice xmlns:v="urn:schemas-microsoft-com:vml" Requires="v">
-                  <p:oleObj spid="_x0000_s402450" name="Equation" r:id="rId10" imgW="609600" imgH="304800" progId="Equation.DSMT4">
+                  <p:oleObj spid="_x0000_s402463" name="Equation" r:id="rId10" imgW="609600" imgH="304800" progId="Equation.DSMT4">
                     <p:embed/>
                   </p:oleObj>
                 </mc:Choice>
@@ -22041,7 +22124,7 @@
           <a:graphicData uri="http://schemas.openxmlformats.org/presentationml/2006/ole">
             <mc:AlternateContent xmlns:mc="http://schemas.openxmlformats.org/markup-compatibility/2006">
               <mc:Choice xmlns:v="urn:schemas-microsoft-com:vml" Requires="v">
-                <p:oleObj spid="_x0000_s358443" name="Equation" r:id="rId4" imgW="419040" imgH="253800" progId="Equation.DSMT4">
+                <p:oleObj spid="_x0000_s358456" name="Equation" r:id="rId4" imgW="419040" imgH="253800" progId="Equation.DSMT4">
                   <p:embed/>
                 </p:oleObj>
               </mc:Choice>
@@ -22142,7 +22225,7 @@
           <a:graphicData uri="http://schemas.openxmlformats.org/presentationml/2006/ole">
             <mc:AlternateContent xmlns:mc="http://schemas.openxmlformats.org/markup-compatibility/2006">
               <mc:Choice xmlns:v="urn:schemas-microsoft-com:vml" Requires="v">
-                <p:oleObj spid="_x0000_s358444" name="Equation" r:id="rId6" imgW="419040" imgH="253800" progId="Equation.DSMT4">
+                <p:oleObj spid="_x0000_s358457" name="Equation" r:id="rId6" imgW="419040" imgH="253800" progId="Equation.DSMT4">
                   <p:embed/>
                 </p:oleObj>
               </mc:Choice>
@@ -22212,7 +22295,7 @@
           <a:graphicData uri="http://schemas.openxmlformats.org/presentationml/2006/ole">
             <mc:AlternateContent xmlns:mc="http://schemas.openxmlformats.org/markup-compatibility/2006">
               <mc:Choice xmlns:v="urn:schemas-microsoft-com:vml" Requires="v">
-                <p:oleObj spid="_x0000_s358445" name="Equation" r:id="rId8" imgW="545760" imgH="266400" progId="Equation.DSMT4">
+                <p:oleObj spid="_x0000_s358458" name="Equation" r:id="rId8" imgW="545760" imgH="266400" progId="Equation.DSMT4">
                   <p:embed/>
                 </p:oleObj>
               </mc:Choice>
@@ -23007,7 +23090,7 @@
           <a:graphicData uri="http://schemas.openxmlformats.org/presentationml/2006/ole">
             <mc:AlternateContent xmlns:mc="http://schemas.openxmlformats.org/markup-compatibility/2006">
               <mc:Choice xmlns:v="urn:schemas-microsoft-com:vml" Requires="v">
-                <p:oleObj spid="_x0000_s358446" name="Equation" r:id="rId10" imgW="622300" imgH="215900" progId="Equation.DSMT4">
+                <p:oleObj spid="_x0000_s358459" name="Equation" r:id="rId10" imgW="622300" imgH="215900" progId="Equation.DSMT4">
                   <p:embed/>
                 </p:oleObj>
               </mc:Choice>
@@ -24066,6 +24149,9 @@
               </a:pPr>
               <a:r>
                 <a:rPr lang="en-US" sz="3200" dirty="0">
+                  <a:solidFill>
+                    <a:srgbClr val="0000FF"/>
+                  </a:solidFill>
                   <a:latin typeface="Comic Sans MS" pitchFamily="66" charset="0"/>
                   <a:cs typeface="Arial" charset="0"/>
                 </a:rPr>
@@ -24110,6 +24196,9 @@
               </a:pPr>
               <a:r>
                 <a:rPr lang="en-US" sz="3200" dirty="0">
+                  <a:solidFill>
+                    <a:srgbClr val="0000FF"/>
+                  </a:solidFill>
                   <a:latin typeface="Comic Sans MS" pitchFamily="66" charset="0"/>
                   <a:cs typeface="Arial" charset="0"/>
                 </a:rPr>
@@ -25036,7 +25125,7 @@
             <a:graphicData uri="http://schemas.openxmlformats.org/presentationml/2006/ole">
               <mc:AlternateContent xmlns:mc="http://schemas.openxmlformats.org/markup-compatibility/2006">
                 <mc:Choice xmlns:v="urn:schemas-microsoft-com:vml" Requires="v">
-                  <p:oleObj spid="_x0000_s1037" name="Equation" r:id="rId4" imgW="520700" imgH="304800" progId="Equation.DSMT4">
+                  <p:oleObj spid="_x0000_s1050" name="Equation" r:id="rId4" imgW="520700" imgH="304800" progId="Equation.DSMT4">
                     <p:embed/>
                   </p:oleObj>
                 </mc:Choice>
@@ -25116,13 +25205,7 @@
                 <a:rPr lang="en-US" sz="4400" dirty="0" smtClean="0">
                   <a:latin typeface="Comic Sans MS" pitchFamily="66" charset="0"/>
                 </a:rPr>
-                <a:t> </a:t>
-              </a:r>
-              <a:r>
-                <a:rPr lang="en-US" sz="4400" dirty="0" smtClean="0">
-                  <a:latin typeface="Comic Sans MS" pitchFamily="66" charset="0"/>
-                </a:rPr>
-                <a:t>to</a:t>
+                <a:t> to</a:t>
               </a:r>
             </a:p>
           </p:txBody>
@@ -25149,7 +25232,7 @@
             <a:graphicData uri="http://schemas.openxmlformats.org/presentationml/2006/ole">
               <mc:AlternateContent xmlns:mc="http://schemas.openxmlformats.org/markup-compatibility/2006">
                 <mc:Choice xmlns:v="urn:schemas-microsoft-com:vml" Requires="v">
-                  <p:oleObj spid="_x0000_s1038" name="Equation" r:id="rId6" imgW="609600" imgH="304800" progId="Equation.DSMT4">
+                  <p:oleObj spid="_x0000_s1051" name="Equation" r:id="rId6" imgW="609600" imgH="304800" progId="Equation.DSMT4">
                     <p:embed/>
                   </p:oleObj>
                 </mc:Choice>
@@ -25220,7 +25303,7 @@
           <a:graphicData uri="http://schemas.openxmlformats.org/presentationml/2006/ole">
             <mc:AlternateContent xmlns:mc="http://schemas.openxmlformats.org/markup-compatibility/2006">
               <mc:Choice xmlns:v="urn:schemas-microsoft-com:vml" Requires="v">
-                <p:oleObj spid="_x0000_s1039" name="Equation" r:id="rId8" imgW="609600" imgH="304800" progId="Equation.DSMT4">
+                <p:oleObj spid="_x0000_s1052" name="Equation" r:id="rId8" imgW="609600" imgH="304800" progId="Equation.DSMT4">
                   <p:embed/>
                 </p:oleObj>
               </mc:Choice>
@@ -26015,7 +26098,7 @@
           <a:graphicData uri="http://schemas.openxmlformats.org/presentationml/2006/ole">
             <mc:AlternateContent xmlns:mc="http://schemas.openxmlformats.org/markup-compatibility/2006">
               <mc:Choice xmlns:v="urn:schemas-microsoft-com:vml" Requires="v">
-                <p:oleObj spid="_x0000_s1040" name="Equation" r:id="rId10" imgW="850900" imgH="228600" progId="Equation.DSMT4">
+                <p:oleObj spid="_x0000_s1053" name="Equation" r:id="rId10" imgW="850900" imgH="228600" progId="Equation.DSMT4">
                   <p:embed/>
                 </p:oleObj>
               </mc:Choice>
@@ -30971,6 +31054,1216 @@
       </p:grpSpPr>
       <p:sp>
         <p:nvSpPr>
+          <p:cNvPr id="13" name="Title 12"/>
+          <p:cNvSpPr>
+            <a:spLocks noGrp="1"/>
+          </p:cNvSpPr>
+          <p:nvPr>
+            <p:ph type="title"/>
+          </p:nvPr>
+        </p:nvSpPr>
+        <p:spPr>
+          <a:xfrm>
+            <a:off x="1940180" y="304799"/>
+            <a:ext cx="5960647" cy="1113035"/>
+          </a:xfrm>
+        </p:spPr>
+        <p:txBody>
+          <a:bodyPr/>
+          <a:lstStyle/>
+          <a:p>
+            <a:r>
+              <a:rPr lang="en-US" sz="3600" dirty="0" err="1" smtClean="0"/>
+              <a:t>Satisfiability</a:t>
+            </a:r>
+            <a:r>
+              <a:rPr lang="en-US" dirty="0" smtClean="0"/>
+              <a:t> &amp; Validity </a:t>
+            </a:r>
+            <a:endParaRPr lang="en-US" sz="3600" dirty="0"/>
+          </a:p>
+        </p:txBody>
+      </p:sp>
+      <p:sp>
+        <p:nvSpPr>
+          <p:cNvPr id="14" name="TextBox 13"/>
+          <p:cNvSpPr txBox="1"/>
+          <p:nvPr/>
+        </p:nvSpPr>
+        <p:spPr>
+          <a:xfrm>
+            <a:off x="202106" y="1642665"/>
+            <a:ext cx="8733258" cy="2308324"/>
+          </a:xfrm>
+          <a:prstGeom prst="rect">
+            <a:avLst/>
+          </a:prstGeom>
+          <a:noFill/>
+        </p:spPr>
+        <p:txBody>
+          <a:bodyPr wrap="square" rtlCol="0">
+            <a:spAutoFit/>
+          </a:bodyPr>
+          <a:lstStyle/>
+          <a:p>
+            <a:pPr algn="l"/>
+            <a:r>
+              <a:rPr lang="en-US" sz="4800" dirty="0" err="1" smtClean="0">
+                <a:solidFill>
+                  <a:schemeClr val="accent1">
+                    <a:lumMod val="50000"/>
+                  </a:schemeClr>
+                </a:solidFill>
+                <a:latin typeface="Comic Sans MS" pitchFamily="66" charset="0"/>
+              </a:rPr>
+              <a:t>satisfiable</a:t>
+            </a:r>
+            <a:r>
+              <a:rPr lang="en-US" sz="4800" dirty="0" smtClean="0">
+                <a:solidFill>
+                  <a:srgbClr val="000000"/>
+                </a:solidFill>
+                <a:latin typeface="Comic Sans MS" pitchFamily="66" charset="0"/>
+              </a:rPr>
+              <a:t>:</a:t>
+            </a:r>
+            <a:r>
+              <a:rPr lang="en-US" sz="4800" dirty="0" smtClean="0">
+                <a:solidFill>
+                  <a:schemeClr val="accent1">
+                    <a:lumMod val="50000"/>
+                  </a:schemeClr>
+                </a:solidFill>
+                <a:latin typeface="Comic Sans MS" pitchFamily="66" charset="0"/>
+              </a:rPr>
+              <a:t>  </a:t>
+            </a:r>
+            <a:r>
+              <a:rPr lang="en-US" sz="4800" dirty="0" smtClean="0">
+                <a:latin typeface="Comic Sans MS" pitchFamily="66" charset="0"/>
+              </a:rPr>
+              <a:t>P,  </a:t>
+            </a:r>
+            <a:r>
+              <a:rPr lang="en-US" sz="4000" dirty="0" smtClean="0">
+                <a:latin typeface="Comic Sans MS" pitchFamily="66" charset="0"/>
+              </a:rPr>
+              <a:t>NOT</a:t>
+            </a:r>
+            <a:r>
+              <a:rPr lang="en-US" sz="4800" dirty="0" smtClean="0">
+                <a:latin typeface="Comic Sans MS" pitchFamily="66" charset="0"/>
+              </a:rPr>
+              <a:t>(P)</a:t>
+            </a:r>
+          </a:p>
+          <a:p>
+            <a:pPr algn="l"/>
+            <a:r>
+              <a:rPr lang="en-US" sz="4400" dirty="0" smtClean="0">
+                <a:solidFill>
+                  <a:srgbClr val="FF0000"/>
+                </a:solidFill>
+                <a:latin typeface="Comic Sans MS" pitchFamily="66" charset="0"/>
+              </a:rPr>
+              <a:t>not</a:t>
+            </a:r>
+            <a:r>
+              <a:rPr lang="en-US" sz="4400" dirty="0" smtClean="0">
+                <a:solidFill>
+                  <a:schemeClr val="accent1">
+                    <a:lumMod val="50000"/>
+                  </a:schemeClr>
+                </a:solidFill>
+                <a:latin typeface="Comic Sans MS" pitchFamily="66" charset="0"/>
+              </a:rPr>
+              <a:t> </a:t>
+            </a:r>
+            <a:r>
+              <a:rPr lang="en-US" sz="4400" dirty="0" err="1" smtClean="0">
+                <a:solidFill>
+                  <a:schemeClr val="accent1">
+                    <a:lumMod val="50000"/>
+                  </a:schemeClr>
+                </a:solidFill>
+                <a:latin typeface="Comic Sans MS" pitchFamily="66" charset="0"/>
+              </a:rPr>
+              <a:t>satisfiable</a:t>
+            </a:r>
+            <a:r>
+              <a:rPr lang="en-US" sz="4400" dirty="0" smtClean="0">
+                <a:solidFill>
+                  <a:srgbClr val="000000"/>
+                </a:solidFill>
+                <a:latin typeface="Comic Sans MS" pitchFamily="66" charset="0"/>
+              </a:rPr>
+              <a:t>:</a:t>
+            </a:r>
+            <a:r>
+              <a:rPr lang="en-US" sz="4800" dirty="0" smtClean="0">
+                <a:solidFill>
+                  <a:srgbClr val="000000"/>
+                </a:solidFill>
+                <a:latin typeface="Comic Sans MS" pitchFamily="66" charset="0"/>
+              </a:rPr>
+              <a:t> (</a:t>
+            </a:r>
+            <a:r>
+              <a:rPr lang="en-US" sz="4800" dirty="0" smtClean="0">
+                <a:latin typeface="Comic Sans MS" pitchFamily="66" charset="0"/>
+              </a:rPr>
+              <a:t>P </a:t>
+            </a:r>
+            <a:r>
+              <a:rPr lang="en-US" sz="4000" dirty="0" smtClean="0">
+                <a:latin typeface="Comic Sans MS" pitchFamily="66" charset="0"/>
+              </a:rPr>
+              <a:t>AND NOT</a:t>
+            </a:r>
+            <a:r>
+              <a:rPr lang="en-US" sz="4800" dirty="0" smtClean="0">
+                <a:latin typeface="Comic Sans MS" pitchFamily="66" charset="0"/>
+              </a:rPr>
+              <a:t>(P))</a:t>
+            </a:r>
+            <a:endParaRPr lang="en-US" sz="4800" dirty="0" smtClean="0">
+              <a:latin typeface="Comic Sans MS" pitchFamily="66" charset="0"/>
+            </a:endParaRPr>
+          </a:p>
+          <a:p>
+            <a:pPr algn="l"/>
+            <a:r>
+              <a:rPr lang="en-US" sz="4800" dirty="0" smtClean="0">
+                <a:solidFill>
+                  <a:schemeClr val="accent1">
+                    <a:lumMod val="50000"/>
+                  </a:schemeClr>
+                </a:solidFill>
+                <a:latin typeface="Comic Sans MS" pitchFamily="66" charset="0"/>
+              </a:rPr>
+              <a:t>valid</a:t>
+            </a:r>
+            <a:r>
+              <a:rPr lang="en-US" sz="4800" dirty="0" smtClean="0">
+                <a:solidFill>
+                  <a:srgbClr val="000000"/>
+                </a:solidFill>
+                <a:latin typeface="Comic Sans MS" pitchFamily="66" charset="0"/>
+              </a:rPr>
+              <a:t>:               </a:t>
+            </a:r>
+            <a:r>
+              <a:rPr lang="en-US" sz="4800" dirty="0" smtClean="0">
+                <a:solidFill>
+                  <a:srgbClr val="000000"/>
+                </a:solidFill>
+                <a:latin typeface="Comic Sans MS" pitchFamily="66" charset="0"/>
+              </a:rPr>
+              <a:t>(</a:t>
+            </a:r>
+            <a:r>
+              <a:rPr lang="en-US" sz="4800" dirty="0">
+                <a:latin typeface="Comic Sans MS" pitchFamily="66" charset="0"/>
+              </a:rPr>
+              <a:t>P </a:t>
+            </a:r>
+            <a:r>
+              <a:rPr lang="en-US" sz="4000" dirty="0" smtClean="0">
+                <a:latin typeface="Comic Sans MS" pitchFamily="66" charset="0"/>
+              </a:rPr>
+              <a:t>OR  </a:t>
+            </a:r>
+            <a:r>
+              <a:rPr lang="en-US" sz="4000" dirty="0">
+                <a:latin typeface="Comic Sans MS" pitchFamily="66" charset="0"/>
+              </a:rPr>
+              <a:t>NOT</a:t>
+            </a:r>
+            <a:r>
+              <a:rPr lang="en-US" sz="4800" dirty="0">
+                <a:latin typeface="Comic Sans MS" pitchFamily="66" charset="0"/>
+              </a:rPr>
+              <a:t>(P))</a:t>
+            </a:r>
+            <a:endParaRPr lang="en-US" sz="4800" dirty="0" smtClean="0">
+              <a:solidFill>
+                <a:srgbClr val="000000"/>
+              </a:solidFill>
+              <a:latin typeface="Comic Sans MS" pitchFamily="66" charset="0"/>
+            </a:endParaRPr>
+          </a:p>
+        </p:txBody>
+      </p:sp>
+      <p:sp>
+        <p:nvSpPr>
+          <p:cNvPr id="8" name="Slide Number Placeholder 2"/>
+          <p:cNvSpPr>
+            <a:spLocks noGrp="1"/>
+          </p:cNvSpPr>
+          <p:nvPr>
+            <p:ph type="sldNum" sz="quarter" idx="10"/>
+          </p:nvPr>
+        </p:nvSpPr>
+        <p:spPr>
+          <a:xfrm>
+            <a:off x="8258822" y="6553200"/>
+            <a:ext cx="885179" cy="276999"/>
+          </a:xfrm>
+          <a:noFill/>
+        </p:spPr>
+        <p:txBody>
+          <a:bodyPr/>
+          <a:lstStyle/>
+          <a:p>
+            <a:r>
+              <a:rPr lang="en-US" dirty="0" err="1" smtClean="0"/>
+              <a:t>lec</a:t>
+            </a:r>
+            <a:r>
+              <a:rPr lang="en-US" dirty="0" smtClean="0"/>
+              <a:t> 2W.</a:t>
+            </a:r>
+            <a:fld id="{0150943C-9303-41DF-A6FA-7E32D6C5D18E}" type="slidenum">
+              <a:rPr lang="en-US" smtClean="0"/>
+              <a:pPr/>
+              <a:t>25</a:t>
+            </a:fld>
+            <a:endParaRPr lang="en-US" dirty="0" smtClean="0"/>
+          </a:p>
+        </p:txBody>
+      </p:sp>
+      <p:sp>
+        <p:nvSpPr>
+          <p:cNvPr id="2" name="TextBox 1"/>
+          <p:cNvSpPr txBox="1"/>
+          <p:nvPr/>
+        </p:nvSpPr>
+        <p:spPr>
+          <a:xfrm>
+            <a:off x="547682" y="4200071"/>
+            <a:ext cx="8042286" cy="1754327"/>
+          </a:xfrm>
+          <a:prstGeom prst="rect">
+            <a:avLst/>
+          </a:prstGeom>
+          <a:noFill/>
+        </p:spPr>
+        <p:txBody>
+          <a:bodyPr wrap="none" rtlCol="0">
+            <a:spAutoFit/>
+          </a:bodyPr>
+          <a:lstStyle/>
+          <a:p>
+            <a:pPr algn="l"/>
+            <a:r>
+              <a:rPr lang="en-US" sz="5400" dirty="0" smtClean="0">
+                <a:latin typeface="Comic Sans MS" pitchFamily="66" charset="0"/>
+              </a:rPr>
+              <a:t>E is </a:t>
+            </a:r>
+            <a:r>
+              <a:rPr lang="en-US" sz="5400" dirty="0" smtClean="0">
+                <a:solidFill>
+                  <a:srgbClr val="0000E5"/>
+                </a:solidFill>
+                <a:latin typeface="Comic Sans MS" pitchFamily="66" charset="0"/>
+              </a:rPr>
+              <a:t>valid </a:t>
+            </a:r>
+            <a:r>
+              <a:rPr lang="en-US" sz="5400" dirty="0" err="1" smtClean="0">
+                <a:latin typeface="Comic Sans MS" pitchFamily="66" charset="0"/>
+              </a:rPr>
+              <a:t>iff</a:t>
+            </a:r>
+            <a:r>
+              <a:rPr lang="en-US" sz="5400" dirty="0" smtClean="0">
+                <a:latin typeface="Comic Sans MS" pitchFamily="66" charset="0"/>
+              </a:rPr>
+              <a:t> </a:t>
+            </a:r>
+          </a:p>
+          <a:p>
+            <a:pPr algn="l"/>
+            <a:r>
+              <a:rPr lang="en-US" sz="4400" dirty="0" smtClean="0">
+                <a:latin typeface="Comic Sans MS" pitchFamily="66" charset="0"/>
+              </a:rPr>
+              <a:t>NOT</a:t>
+            </a:r>
+            <a:r>
+              <a:rPr lang="en-US" sz="5400" dirty="0" smtClean="0">
+                <a:latin typeface="Comic Sans MS" pitchFamily="66" charset="0"/>
+              </a:rPr>
+              <a:t>(E) is </a:t>
+            </a:r>
+            <a:r>
+              <a:rPr lang="en-US" sz="5400" dirty="0">
+                <a:solidFill>
+                  <a:srgbClr val="FF0000"/>
+                </a:solidFill>
+                <a:latin typeface="Comic Sans MS" pitchFamily="66" charset="0"/>
+              </a:rPr>
+              <a:t>not</a:t>
+            </a:r>
+            <a:r>
+              <a:rPr lang="en-US" sz="5400" dirty="0">
+                <a:solidFill>
+                  <a:schemeClr val="accent1">
+                    <a:lumMod val="50000"/>
+                  </a:schemeClr>
+                </a:solidFill>
+                <a:latin typeface="Comic Sans MS" pitchFamily="66" charset="0"/>
+              </a:rPr>
+              <a:t> </a:t>
+            </a:r>
+            <a:r>
+              <a:rPr lang="en-US" sz="5400" dirty="0" err="1">
+                <a:solidFill>
+                  <a:schemeClr val="accent1">
+                    <a:lumMod val="50000"/>
+                  </a:schemeClr>
+                </a:solidFill>
+                <a:latin typeface="Comic Sans MS" pitchFamily="66" charset="0"/>
+              </a:rPr>
+              <a:t>satisfiable</a:t>
+            </a:r>
+            <a:endParaRPr lang="en-US" sz="5400" dirty="0" smtClean="0">
+              <a:latin typeface="Comic Sans MS" pitchFamily="66" charset="0"/>
+            </a:endParaRPr>
+          </a:p>
+        </p:txBody>
+      </p:sp>
+    </p:spTree>
+    <p:extLst>
+      <p:ext uri="{BB962C8B-B14F-4D97-AF65-F5344CB8AC3E}">
+        <p14:creationId xmlns:p14="http://schemas.microsoft.com/office/powerpoint/2010/main" val="1014289013"/>
+      </p:ext>
+    </p:extLst>
+  </p:cSld>
+  <p:clrMapOvr>
+    <a:masterClrMapping/>
+  </p:clrMapOvr>
+  <p:transition xmlns:p14="http://schemas.microsoft.com/office/powerpoint/2010/main">
+    <p:fade thruBlk="1"/>
+  </p:transition>
+  <p:timing>
+    <p:tnLst>
+      <p:par>
+        <p:cTn xmlns:p14="http://schemas.microsoft.com/office/powerpoint/2010/main" id="1" dur="indefinite" restart="never" nodeType="tmRoot">
+          <p:childTnLst>
+            <p:seq concurrent="1" nextAc="seek">
+              <p:cTn id="2" dur="indefinite" nodeType="mainSeq">
+                <p:childTnLst>
+                  <p:par>
+                    <p:cTn id="3" fill="hold">
+                      <p:stCondLst>
+                        <p:cond delay="indefinite"/>
+                      </p:stCondLst>
+                      <p:childTnLst>
+                        <p:par>
+                          <p:cTn id="4" fill="hold">
+                            <p:stCondLst>
+                              <p:cond delay="0"/>
+                            </p:stCondLst>
+                            <p:childTnLst>
+                              <p:par>
+                                <p:cTn id="5" presetID="22" presetClass="entr" presetSubtype="8" fill="hold" grpId="0" nodeType="clickEffect">
+                                  <p:stCondLst>
+                                    <p:cond delay="0"/>
+                                  </p:stCondLst>
+                                  <p:childTnLst>
+                                    <p:set>
+                                      <p:cBhvr>
+                                        <p:cTn id="6" dur="1" fill="hold">
+                                          <p:stCondLst>
+                                            <p:cond delay="0"/>
+                                          </p:stCondLst>
+                                        </p:cTn>
+                                        <p:tgtEl>
+                                          <p:spTgt spid="14">
+                                            <p:txEl>
+                                              <p:pRg st="1" end="1"/>
+                                            </p:txEl>
+                                          </p:spTgt>
+                                        </p:tgtEl>
+                                        <p:attrNameLst>
+                                          <p:attrName>style.visibility</p:attrName>
+                                        </p:attrNameLst>
+                                      </p:cBhvr>
+                                      <p:to>
+                                        <p:strVal val="visible"/>
+                                      </p:to>
+                                    </p:set>
+                                    <p:animEffect transition="in" filter="wipe(left)">
+                                      <p:cBhvr>
+                                        <p:cTn id="7" dur="500"/>
+                                        <p:tgtEl>
+                                          <p:spTgt spid="14">
+                                            <p:txEl>
+                                              <p:pRg st="1" end="1"/>
+                                            </p:txEl>
+                                          </p:spTgt>
+                                        </p:tgtEl>
+                                      </p:cBhvr>
+                                    </p:animEffect>
+                                  </p:childTnLst>
+                                </p:cTn>
+                              </p:par>
+                            </p:childTnLst>
+                          </p:cTn>
+                        </p:par>
+                      </p:childTnLst>
+                    </p:cTn>
+                  </p:par>
+                  <p:par>
+                    <p:cTn id="8" fill="hold">
+                      <p:stCondLst>
+                        <p:cond delay="indefinite"/>
+                      </p:stCondLst>
+                      <p:childTnLst>
+                        <p:par>
+                          <p:cTn id="9" fill="hold">
+                            <p:stCondLst>
+                              <p:cond delay="0"/>
+                            </p:stCondLst>
+                            <p:childTnLst>
+                              <p:par>
+                                <p:cTn id="10" presetID="22" presetClass="entr" presetSubtype="8" fill="hold" grpId="0" nodeType="clickEffect">
+                                  <p:stCondLst>
+                                    <p:cond delay="0"/>
+                                  </p:stCondLst>
+                                  <p:childTnLst>
+                                    <p:set>
+                                      <p:cBhvr>
+                                        <p:cTn id="11" dur="1" fill="hold">
+                                          <p:stCondLst>
+                                            <p:cond delay="0"/>
+                                          </p:stCondLst>
+                                        </p:cTn>
+                                        <p:tgtEl>
+                                          <p:spTgt spid="14">
+                                            <p:txEl>
+                                              <p:pRg st="2" end="2"/>
+                                            </p:txEl>
+                                          </p:spTgt>
+                                        </p:tgtEl>
+                                        <p:attrNameLst>
+                                          <p:attrName>style.visibility</p:attrName>
+                                        </p:attrNameLst>
+                                      </p:cBhvr>
+                                      <p:to>
+                                        <p:strVal val="visible"/>
+                                      </p:to>
+                                    </p:set>
+                                    <p:animEffect transition="in" filter="wipe(left)">
+                                      <p:cBhvr>
+                                        <p:cTn id="12" dur="500"/>
+                                        <p:tgtEl>
+                                          <p:spTgt spid="14">
+                                            <p:txEl>
+                                              <p:pRg st="2" end="2"/>
+                                            </p:txEl>
+                                          </p:spTgt>
+                                        </p:tgtEl>
+                                      </p:cBhvr>
+                                    </p:animEffect>
+                                  </p:childTnLst>
+                                </p:cTn>
+                              </p:par>
+                            </p:childTnLst>
+                          </p:cTn>
+                        </p:par>
+                      </p:childTnLst>
+                    </p:cTn>
+                  </p:par>
+                  <p:par>
+                    <p:cTn id="13" fill="hold">
+                      <p:stCondLst>
+                        <p:cond delay="indefinite"/>
+                      </p:stCondLst>
+                      <p:childTnLst>
+                        <p:par>
+                          <p:cTn id="14" fill="hold">
+                            <p:stCondLst>
+                              <p:cond delay="0"/>
+                            </p:stCondLst>
+                            <p:childTnLst>
+                              <p:par>
+                                <p:cTn id="15" presetID="9" presetClass="entr" presetSubtype="0" fill="hold" grpId="0" nodeType="clickEffect">
+                                  <p:stCondLst>
+                                    <p:cond delay="0"/>
+                                  </p:stCondLst>
+                                  <p:childTnLst>
+                                    <p:set>
+                                      <p:cBhvr>
+                                        <p:cTn id="16" dur="1" fill="hold">
+                                          <p:stCondLst>
+                                            <p:cond delay="0"/>
+                                          </p:stCondLst>
+                                        </p:cTn>
+                                        <p:tgtEl>
+                                          <p:spTgt spid="2"/>
+                                        </p:tgtEl>
+                                        <p:attrNameLst>
+                                          <p:attrName>style.visibility</p:attrName>
+                                        </p:attrNameLst>
+                                      </p:cBhvr>
+                                      <p:to>
+                                        <p:strVal val="visible"/>
+                                      </p:to>
+                                    </p:set>
+                                    <p:animEffect transition="in" filter="dissolve">
+                                      <p:cBhvr>
+                                        <p:cTn id="17" dur="500"/>
+                                        <p:tgtEl>
+                                          <p:spTgt spid="2"/>
+                                        </p:tgtEl>
+                                      </p:cBhvr>
+                                    </p:animEffect>
+                                  </p:childTnLst>
+                                </p:cTn>
+                              </p:par>
+                            </p:childTnLst>
+                          </p:cTn>
+                        </p:par>
+                      </p:childTnLst>
+                    </p:cTn>
+                  </p:par>
+                </p:childTnLst>
+              </p:cTn>
+              <p:prevCondLst>
+                <p:cond evt="onPrev" delay="0">
+                  <p:tgtEl>
+                    <p:sldTgt/>
+                  </p:tgtEl>
+                </p:cond>
+              </p:prevCondLst>
+              <p:nextCondLst>
+                <p:cond evt="onNext" delay="0">
+                  <p:tgtEl>
+                    <p:sldTgt/>
+                  </p:tgtEl>
+                </p:cond>
+              </p:nextCondLst>
+            </p:seq>
+          </p:childTnLst>
+        </p:cTn>
+      </p:par>
+    </p:tnLst>
+    <p:bldLst>
+      <p:bldP spid="14" grpId="0" build="p"/>
+      <p:bldP spid="2" grpId="0"/>
+    </p:bldLst>
+  </p:timing>
+</p:sld>
+</file>
+
+<file path=ppt/slides/slide26.xml><?xml version="1.0" encoding="utf-8"?>
+<p:sld xmlns:a="http://schemas.openxmlformats.org/drawingml/2006/main" xmlns:r="http://schemas.openxmlformats.org/officeDocument/2006/relationships" xmlns:p="http://schemas.openxmlformats.org/presentationml/2006/main" show="0">
+  <p:cSld>
+    <p:spTree>
+      <p:nvGrpSpPr>
+        <p:cNvPr id="1" name=""/>
+        <p:cNvGrpSpPr/>
+        <p:nvPr/>
+      </p:nvGrpSpPr>
+      <p:grpSpPr>
+        <a:xfrm>
+          <a:off x="0" y="0"/>
+          <a:ext cx="0" cy="0"/>
+          <a:chOff x="0" y="0"/>
+          <a:chExt cx="0" cy="0"/>
+        </a:xfrm>
+      </p:grpSpPr>
+      <p:sp>
+        <p:nvSpPr>
+          <p:cNvPr id="13" name="Title 12"/>
+          <p:cNvSpPr>
+            <a:spLocks noGrp="1"/>
+          </p:cNvSpPr>
+          <p:nvPr>
+            <p:ph type="title"/>
+          </p:nvPr>
+        </p:nvSpPr>
+        <p:spPr>
+          <a:xfrm>
+            <a:off x="1940181" y="304799"/>
+            <a:ext cx="5248416" cy="1101969"/>
+          </a:xfrm>
+        </p:spPr>
+        <p:txBody>
+          <a:bodyPr/>
+          <a:lstStyle/>
+          <a:p>
+            <a:r>
+              <a:rPr lang="en-US" sz="3600" dirty="0" smtClean="0"/>
+              <a:t>Equivalence &amp; Validity</a:t>
+            </a:r>
+            <a:endParaRPr lang="en-US" sz="3600" dirty="0"/>
+          </a:p>
+        </p:txBody>
+      </p:sp>
+      <p:sp>
+        <p:nvSpPr>
+          <p:cNvPr id="14" name="TextBox 13"/>
+          <p:cNvSpPr txBox="1"/>
+          <p:nvPr/>
+        </p:nvSpPr>
+        <p:spPr>
+          <a:xfrm>
+            <a:off x="693500" y="2291127"/>
+            <a:ext cx="7782678" cy="1938992"/>
+          </a:xfrm>
+          <a:prstGeom prst="rect">
+            <a:avLst/>
+          </a:prstGeom>
+          <a:noFill/>
+        </p:spPr>
+        <p:txBody>
+          <a:bodyPr wrap="square" rtlCol="0">
+            <a:spAutoFit/>
+          </a:bodyPr>
+          <a:lstStyle/>
+          <a:p>
+            <a:pPr algn="l"/>
+            <a:r>
+              <a:rPr lang="en-US" sz="6000" dirty="0" smtClean="0">
+                <a:latin typeface="Comic Sans MS" pitchFamily="66" charset="0"/>
+              </a:rPr>
+              <a:t>A formula is </a:t>
+            </a:r>
+            <a:r>
+              <a:rPr lang="en-US" sz="6000" dirty="0" smtClean="0">
+                <a:solidFill>
+                  <a:schemeClr val="accent1">
+                    <a:lumMod val="50000"/>
+                  </a:schemeClr>
+                </a:solidFill>
+                <a:latin typeface="Comic Sans MS" pitchFamily="66" charset="0"/>
+              </a:rPr>
+              <a:t>valid </a:t>
+            </a:r>
+            <a:r>
+              <a:rPr lang="en-US" sz="6000" dirty="0" err="1" smtClean="0">
+                <a:latin typeface="Comic Sans MS" pitchFamily="66" charset="0"/>
+              </a:rPr>
+              <a:t>iff</a:t>
+            </a:r>
+            <a:endParaRPr lang="en-US" sz="6000" dirty="0" smtClean="0">
+              <a:latin typeface="Comic Sans MS" pitchFamily="66" charset="0"/>
+            </a:endParaRPr>
+          </a:p>
+          <a:p>
+            <a:pPr algn="l"/>
+            <a:r>
+              <a:rPr lang="en-US" sz="6000" dirty="0" smtClean="0">
+                <a:latin typeface="Comic Sans MS" pitchFamily="66" charset="0"/>
+              </a:rPr>
+              <a:t>it is equivalent to </a:t>
+            </a:r>
+            <a:r>
+              <a:rPr lang="en-US" sz="6000" dirty="0" smtClean="0">
+                <a:solidFill>
+                  <a:srgbClr val="008000"/>
+                </a:solidFill>
+                <a:latin typeface="Comic Sans MS" pitchFamily="66" charset="0"/>
+              </a:rPr>
+              <a:t>T</a:t>
+            </a:r>
+            <a:r>
+              <a:rPr lang="en-US" sz="6000" dirty="0" smtClean="0">
+                <a:latin typeface="Comic Sans MS" pitchFamily="66" charset="0"/>
+              </a:rPr>
+              <a:t>. </a:t>
+            </a:r>
+            <a:endParaRPr lang="en-US" sz="6000" dirty="0">
+              <a:latin typeface="Comic Sans MS" pitchFamily="66" charset="0"/>
+            </a:endParaRPr>
+          </a:p>
+        </p:txBody>
+      </p:sp>
+      <p:sp>
+        <p:nvSpPr>
+          <p:cNvPr id="8" name="Slide Number Placeholder 2"/>
+          <p:cNvSpPr>
+            <a:spLocks noGrp="1"/>
+          </p:cNvSpPr>
+          <p:nvPr>
+            <p:ph type="sldNum" sz="quarter" idx="10"/>
+          </p:nvPr>
+        </p:nvSpPr>
+        <p:spPr>
+          <a:xfrm>
+            <a:off x="8227765" y="6553200"/>
+            <a:ext cx="916236" cy="276999"/>
+          </a:xfrm>
+          <a:noFill/>
+        </p:spPr>
+        <p:txBody>
+          <a:bodyPr/>
+          <a:lstStyle/>
+          <a:p>
+            <a:r>
+              <a:rPr lang="en-US" dirty="0" err="1" smtClean="0"/>
+              <a:t>lec</a:t>
+            </a:r>
+            <a:r>
+              <a:rPr lang="en-US" dirty="0" smtClean="0"/>
+              <a:t> 2W.</a:t>
+            </a:r>
+            <a:fld id="{0150943C-9303-41DF-A6FA-7E32D6C5D18E}" type="slidenum">
+              <a:rPr lang="en-US" smtClean="0"/>
+              <a:pPr/>
+              <a:t>26</a:t>
+            </a:fld>
+            <a:endParaRPr lang="en-US" dirty="0" smtClean="0"/>
+          </a:p>
+        </p:txBody>
+      </p:sp>
+    </p:spTree>
+  </p:cSld>
+  <p:clrMapOvr>
+    <a:masterClrMapping/>
+  </p:clrMapOvr>
+  <p:transition xmlns:p14="http://schemas.microsoft.com/office/powerpoint/2010/main" spd="slow">
+    <p:fade thruBlk="1"/>
+  </p:transition>
+  <p:timing>
+    <p:tnLst>
+      <p:par>
+        <p:cTn xmlns:p14="http://schemas.microsoft.com/office/powerpoint/2010/main" id="1" dur="indefinite" restart="never" nodeType="tmRoot"/>
+      </p:par>
+    </p:tnLst>
+  </p:timing>
+</p:sld>
+</file>
+
+<file path=ppt/slides/slide27.xml><?xml version="1.0" encoding="utf-8"?>
+<p:sld xmlns:a="http://schemas.openxmlformats.org/drawingml/2006/main" xmlns:r="http://schemas.openxmlformats.org/officeDocument/2006/relationships" xmlns:p="http://schemas.openxmlformats.org/presentationml/2006/main" show="0">
+  <p:cSld>
+    <p:spTree>
+      <p:nvGrpSpPr>
+        <p:cNvPr id="1" name=""/>
+        <p:cNvGrpSpPr/>
+        <p:nvPr/>
+      </p:nvGrpSpPr>
+      <p:grpSpPr>
+        <a:xfrm>
+          <a:off x="0" y="0"/>
+          <a:ext cx="0" cy="0"/>
+          <a:chOff x="0" y="0"/>
+          <a:chExt cx="0" cy="0"/>
+        </a:xfrm>
+      </p:grpSpPr>
+      <p:sp>
+        <p:nvSpPr>
+          <p:cNvPr id="14" name="TextBox 13"/>
+          <p:cNvSpPr txBox="1"/>
+          <p:nvPr/>
+        </p:nvSpPr>
+        <p:spPr>
+          <a:xfrm>
+            <a:off x="256854" y="2147291"/>
+            <a:ext cx="8650840" cy="2416046"/>
+          </a:xfrm>
+          <a:prstGeom prst="rect">
+            <a:avLst/>
+          </a:prstGeom>
+          <a:noFill/>
+        </p:spPr>
+        <p:txBody>
+          <a:bodyPr wrap="square" rtlCol="0">
+            <a:spAutoFit/>
+          </a:bodyPr>
+          <a:lstStyle/>
+          <a:p>
+            <a:pPr algn="l">
+              <a:spcBef>
+                <a:spcPts val="1200"/>
+              </a:spcBef>
+            </a:pPr>
+            <a:r>
+              <a:rPr lang="en-US" sz="6000" dirty="0" smtClean="0">
+                <a:latin typeface="Comic Sans MS" pitchFamily="66" charset="0"/>
+              </a:rPr>
+              <a:t>Formula </a:t>
+            </a:r>
+            <a:r>
+              <a:rPr lang="en-US" sz="6600" dirty="0" smtClean="0">
+                <a:solidFill>
+                  <a:srgbClr val="BB0FAB"/>
+                </a:solidFill>
+                <a:latin typeface="Comic Sans MS" pitchFamily="66" charset="0"/>
+              </a:rPr>
+              <a:t>G</a:t>
+            </a:r>
+            <a:r>
+              <a:rPr lang="en-US" sz="6000" dirty="0" smtClean="0">
+                <a:solidFill>
+                  <a:srgbClr val="BB0FAB"/>
+                </a:solidFill>
+                <a:latin typeface="Comic Sans MS" pitchFamily="66" charset="0"/>
+              </a:rPr>
+              <a:t> is </a:t>
+            </a:r>
+            <a:r>
+              <a:rPr lang="en-US" sz="6000" dirty="0" err="1" smtClean="0">
+                <a:solidFill>
+                  <a:srgbClr val="BB0FAB"/>
+                </a:solidFill>
+                <a:latin typeface="Comic Sans MS" pitchFamily="66" charset="0"/>
+              </a:rPr>
+              <a:t>satisfiable</a:t>
+            </a:r>
+            <a:endParaRPr lang="en-US" sz="6000" dirty="0" smtClean="0">
+              <a:solidFill>
+                <a:srgbClr val="BB0FAB"/>
+              </a:solidFill>
+              <a:latin typeface="Comic Sans MS" pitchFamily="66" charset="0"/>
+            </a:endParaRPr>
+          </a:p>
+          <a:p>
+            <a:pPr algn="l">
+              <a:spcBef>
+                <a:spcPts val="3000"/>
+              </a:spcBef>
+            </a:pPr>
+            <a:r>
+              <a:rPr lang="en-US" sz="6000" dirty="0" smtClean="0">
+                <a:latin typeface="Comic Sans MS" pitchFamily="66" charset="0"/>
+              </a:rPr>
+              <a:t>       </a:t>
+            </a:r>
+            <a:r>
+              <a:rPr lang="en-US" sz="6000" dirty="0" err="1" smtClean="0">
+                <a:latin typeface="Comic Sans MS" pitchFamily="66" charset="0"/>
+              </a:rPr>
+              <a:t>iff</a:t>
+            </a:r>
+            <a:r>
+              <a:rPr lang="en-US" sz="6000" dirty="0" smtClean="0">
+                <a:latin typeface="Comic Sans MS" pitchFamily="66" charset="0"/>
+              </a:rPr>
+              <a:t>      </a:t>
+            </a:r>
+            <a:r>
+              <a:rPr lang="en-US" sz="6000" dirty="0" smtClean="0">
+                <a:solidFill>
+                  <a:schemeClr val="accent1">
+                    <a:lumMod val="50000"/>
+                  </a:schemeClr>
+                </a:solidFill>
+                <a:latin typeface="Comic Sans MS" pitchFamily="66" charset="0"/>
+              </a:rPr>
+              <a:t>is not valid</a:t>
+            </a:r>
+            <a:r>
+              <a:rPr lang="en-US" sz="6000" dirty="0" smtClean="0">
+                <a:latin typeface="Comic Sans MS" pitchFamily="66" charset="0"/>
+              </a:rPr>
+              <a:t>.</a:t>
+            </a:r>
+            <a:endParaRPr lang="en-US" sz="6000" dirty="0">
+              <a:latin typeface="Comic Sans MS" pitchFamily="66" charset="0"/>
+            </a:endParaRPr>
+          </a:p>
+        </p:txBody>
+      </p:sp>
+      <p:sp>
+        <p:nvSpPr>
+          <p:cNvPr id="8" name="Slide Number Placeholder 2"/>
+          <p:cNvSpPr>
+            <a:spLocks noGrp="1"/>
+          </p:cNvSpPr>
+          <p:nvPr>
+            <p:ph type="sldNum" sz="quarter" idx="10"/>
+          </p:nvPr>
+        </p:nvSpPr>
+        <p:spPr>
+          <a:xfrm>
+            <a:off x="8227765" y="6553200"/>
+            <a:ext cx="916236" cy="276999"/>
+          </a:xfrm>
+          <a:noFill/>
+        </p:spPr>
+        <p:txBody>
+          <a:bodyPr/>
+          <a:lstStyle/>
+          <a:p>
+            <a:r>
+              <a:rPr lang="en-US" dirty="0" err="1" smtClean="0"/>
+              <a:t>lec</a:t>
+            </a:r>
+            <a:r>
+              <a:rPr lang="en-US" dirty="0" smtClean="0"/>
+              <a:t> 2W.</a:t>
+            </a:r>
+            <a:fld id="{0150943C-9303-41DF-A6FA-7E32D6C5D18E}" type="slidenum">
+              <a:rPr lang="en-US" smtClean="0"/>
+              <a:pPr/>
+              <a:t>27</a:t>
+            </a:fld>
+            <a:endParaRPr lang="en-US" dirty="0" smtClean="0"/>
+          </a:p>
+        </p:txBody>
+      </p:sp>
+      <p:graphicFrame>
+        <p:nvGraphicFramePr>
+          <p:cNvPr id="5" name="Object 4"/>
+          <p:cNvGraphicFramePr>
+            <a:graphicFrameLocks noChangeAspect="1"/>
+          </p:cNvGraphicFramePr>
+          <p:nvPr/>
+        </p:nvGraphicFramePr>
+        <p:xfrm>
+          <a:off x="3156994" y="3101055"/>
+          <a:ext cx="983467" cy="1475201"/>
+        </p:xfrm>
+        <a:graphic>
+          <a:graphicData uri="http://schemas.openxmlformats.org/presentationml/2006/ole">
+            <mc:AlternateContent xmlns:mc="http://schemas.openxmlformats.org/markup-compatibility/2006">
+              <mc:Choice xmlns:v="urn:schemas-microsoft-com:vml" Requires="v">
+                <p:oleObj spid="_x0000_s359441" name="Equation" r:id="rId4" imgW="152280" imgH="228600" progId="Equation.DSMT4">
+                  <p:embed/>
+                </p:oleObj>
+              </mc:Choice>
+              <mc:Fallback>
+                <p:oleObj name="Equation" r:id="rId4" imgW="152280" imgH="228600" progId="Equation.DSMT4">
+                  <p:embed/>
+                  <p:pic>
+                    <p:nvPicPr>
+                      <p:cNvPr id="0" name="Picture 2"/>
+                      <p:cNvPicPr>
+                        <a:picLocks noChangeAspect="1" noChangeArrowheads="1"/>
+                      </p:cNvPicPr>
+                      <p:nvPr/>
+                    </p:nvPicPr>
+                    <p:blipFill>
+                      <a:blip r:embed="rId5">
+                        <a:extLst>
+                          <a:ext uri="{28A0092B-C50C-407E-A947-70E740481C1C}">
+                            <a14:useLocalDpi xmlns:a14="http://schemas.microsoft.com/office/drawing/2010/main" val="0"/>
+                          </a:ext>
+                        </a:extLst>
+                      </a:blip>
+                      <a:srcRect/>
+                      <a:stretch>
+                        <a:fillRect/>
+                      </a:stretch>
+                    </p:blipFill>
+                    <p:spPr bwMode="auto">
+                      <a:xfrm>
+                        <a:off x="3156994" y="3101055"/>
+                        <a:ext cx="983467" cy="1475201"/>
+                      </a:xfrm>
+                      <a:prstGeom prst="rect">
+                        <a:avLst/>
+                      </a:prstGeom>
+                      <a:noFill/>
+                      <a:extLst>
+                        <a:ext uri="{909E8E84-426E-40dd-AFC4-6F175D3DCCD1}">
+                          <a14:hiddenFill xmlns:a14="http://schemas.microsoft.com/office/drawing/2010/main">
+                            <a:solidFill>
+                              <a:srgbClr val="FFFFFF"/>
+                            </a:solidFill>
+                          </a14:hiddenFill>
+                        </a:ext>
+                      </a:extLst>
+                    </p:spPr>
+                  </p:pic>
+                </p:oleObj>
+              </mc:Fallback>
+            </mc:AlternateContent>
+          </a:graphicData>
+        </a:graphic>
+      </p:graphicFrame>
+      <p:sp>
+        <p:nvSpPr>
+          <p:cNvPr id="7" name="Title 12"/>
+          <p:cNvSpPr>
+            <a:spLocks noGrp="1"/>
+          </p:cNvSpPr>
+          <p:nvPr>
+            <p:ph type="title"/>
+          </p:nvPr>
+        </p:nvSpPr>
+        <p:spPr>
+          <a:xfrm>
+            <a:off x="1940180" y="304799"/>
+            <a:ext cx="5960647" cy="1113035"/>
+          </a:xfrm>
+        </p:spPr>
+        <p:txBody>
+          <a:bodyPr/>
+          <a:lstStyle/>
+          <a:p>
+            <a:r>
+              <a:rPr lang="en-US" sz="3600" dirty="0" err="1" smtClean="0"/>
+              <a:t>Vailidity</a:t>
+            </a:r>
+            <a:r>
+              <a:rPr lang="en-US" sz="3600" dirty="0" smtClean="0"/>
+              <a:t> &amp; </a:t>
+            </a:r>
+            <a:r>
+              <a:rPr lang="en-US" sz="3600" dirty="0" err="1" smtClean="0"/>
+              <a:t>Satisfiability</a:t>
+            </a:r>
+            <a:endParaRPr lang="en-US" sz="3600" dirty="0"/>
+          </a:p>
+        </p:txBody>
+      </p:sp>
+    </p:spTree>
+  </p:cSld>
+  <p:clrMapOvr>
+    <a:masterClrMapping/>
+  </p:clrMapOvr>
+  <p:transition xmlns:p14="http://schemas.microsoft.com/office/powerpoint/2010/main"/>
+  <p:timing>
+    <p:tnLst>
+      <p:par>
+        <p:cTn xmlns:p14="http://schemas.microsoft.com/office/powerpoint/2010/main" id="1" dur="indefinite" restart="never" nodeType="tmRoot">
+          <p:childTnLst>
+            <p:seq concurrent="1" nextAc="seek">
+              <p:cTn id="2" dur="indefinite" nodeType="mainSeq">
+                <p:childTnLst>
+                  <p:par>
+                    <p:cTn id="3" fill="hold">
+                      <p:stCondLst>
+                        <p:cond delay="indefinite"/>
+                      </p:stCondLst>
+                      <p:childTnLst>
+                        <p:par>
+                          <p:cTn id="4" fill="hold">
+                            <p:stCondLst>
+                              <p:cond delay="0"/>
+                            </p:stCondLst>
+                            <p:childTnLst>
+                              <p:par>
+                                <p:cTn id="5" presetID="9" presetClass="entr" presetSubtype="0" fill="hold" nodeType="clickEffect">
+                                  <p:stCondLst>
+                                    <p:cond delay="0"/>
+                                  </p:stCondLst>
+                                  <p:childTnLst>
+                                    <p:set>
+                                      <p:cBhvr>
+                                        <p:cTn id="6" dur="1" fill="hold">
+                                          <p:stCondLst>
+                                            <p:cond delay="0"/>
+                                          </p:stCondLst>
+                                        </p:cTn>
+                                        <p:tgtEl>
+                                          <p:spTgt spid="14">
+                                            <p:txEl>
+                                              <p:pRg st="0" end="0"/>
+                                            </p:txEl>
+                                          </p:spTgt>
+                                        </p:tgtEl>
+                                        <p:attrNameLst>
+                                          <p:attrName>style.visibility</p:attrName>
+                                        </p:attrNameLst>
+                                      </p:cBhvr>
+                                      <p:to>
+                                        <p:strVal val="visible"/>
+                                      </p:to>
+                                    </p:set>
+                                    <p:animEffect transition="in" filter="dissolve">
+                                      <p:cBhvr>
+                                        <p:cTn id="7" dur="500"/>
+                                        <p:tgtEl>
+                                          <p:spTgt spid="14">
+                                            <p:txEl>
+                                              <p:pRg st="0" end="0"/>
+                                            </p:txEl>
+                                          </p:spTgt>
+                                        </p:tgtEl>
+                                      </p:cBhvr>
+                                    </p:animEffect>
+                                  </p:childTnLst>
+                                </p:cTn>
+                              </p:par>
+                              <p:par>
+                                <p:cTn id="8" presetID="1" presetClass="entr" presetSubtype="0" fill="hold" nodeType="withEffect">
+                                  <p:stCondLst>
+                                    <p:cond delay="0"/>
+                                  </p:stCondLst>
+                                  <p:childTnLst>
+                                    <p:set>
+                                      <p:cBhvr>
+                                        <p:cTn id="9" dur="1" fill="hold">
+                                          <p:stCondLst>
+                                            <p:cond delay="0"/>
+                                          </p:stCondLst>
+                                        </p:cTn>
+                                        <p:tgtEl>
+                                          <p:spTgt spid="14">
+                                            <p:txEl>
+                                              <p:pRg st="1" end="1"/>
+                                            </p:txEl>
+                                          </p:spTgt>
+                                        </p:tgtEl>
+                                        <p:attrNameLst>
+                                          <p:attrName>style.visibility</p:attrName>
+                                        </p:attrNameLst>
+                                      </p:cBhvr>
+                                      <p:to>
+                                        <p:strVal val="visible"/>
+                                      </p:to>
+                                    </p:set>
+                                  </p:childTnLst>
+                                </p:cTn>
+                              </p:par>
+                            </p:childTnLst>
+                          </p:cTn>
+                        </p:par>
+                      </p:childTnLst>
+                    </p:cTn>
+                  </p:par>
+                </p:childTnLst>
+              </p:cTn>
+              <p:prevCondLst>
+                <p:cond evt="onPrev" delay="0">
+                  <p:tgtEl>
+                    <p:sldTgt/>
+                  </p:tgtEl>
+                </p:cond>
+              </p:prevCondLst>
+              <p:nextCondLst>
+                <p:cond evt="onNext" delay="0">
+                  <p:tgtEl>
+                    <p:sldTgt/>
+                  </p:tgtEl>
+                </p:cond>
+              </p:nextCondLst>
+            </p:seq>
+          </p:childTnLst>
+        </p:cTn>
+      </p:par>
+    </p:tnLst>
+  </p:timing>
+</p:sld>
+</file>
+
+<file path=ppt/slides/slide28.xml><?xml version="1.0" encoding="utf-8"?>
+<p:sld xmlns:a="http://schemas.openxmlformats.org/drawingml/2006/main" xmlns:r="http://schemas.openxmlformats.org/officeDocument/2006/relationships" xmlns:p="http://schemas.openxmlformats.org/presentationml/2006/main">
+  <p:cSld>
+    <p:spTree>
+      <p:nvGrpSpPr>
+        <p:cNvPr id="1" name=""/>
+        <p:cNvGrpSpPr/>
+        <p:nvPr/>
+      </p:nvGrpSpPr>
+      <p:grpSpPr>
+        <a:xfrm>
+          <a:off x="0" y="0"/>
+          <a:ext cx="0" cy="0"/>
+          <a:chOff x="0" y="0"/>
+          <a:chExt cx="0" cy="0"/>
+        </a:xfrm>
+      </p:grpSpPr>
+      <p:sp>
+        <p:nvSpPr>
           <p:cNvPr id="2" name="Title 1"/>
           <p:cNvSpPr>
             <a:spLocks noGrp="1"/>
@@ -31362,7 +32655,7 @@
 </p:sld>
 </file>
 
-<file path=ppt/slides/slide26.xml><?xml version="1.0" encoding="utf-8"?>
+<file path=ppt/slides/slide29.xml><?xml version="1.0" encoding="utf-8"?>
 <p:sld xmlns:a="http://schemas.openxmlformats.org/drawingml/2006/main" xmlns:r="http://schemas.openxmlformats.org/officeDocument/2006/relationships" xmlns:p="http://schemas.openxmlformats.org/presentationml/2006/main">
   <p:cSld>
     <p:spTree>
@@ -31528,8 +32821,8 @@
 </p:sld>
 </file>
 
-<file path=ppt/slides/slide27.xml><?xml version="1.0" encoding="utf-8"?>
-<p:sld xmlns:a="http://schemas.openxmlformats.org/drawingml/2006/main" xmlns:r="http://schemas.openxmlformats.org/officeDocument/2006/relationships" xmlns:p="http://schemas.openxmlformats.org/presentationml/2006/main" show="0">
+<file path=ppt/slides/slide3.xml><?xml version="1.0" encoding="utf-8"?>
+<p:sld xmlns:a="http://schemas.openxmlformats.org/drawingml/2006/main" xmlns:r="http://schemas.openxmlformats.org/officeDocument/2006/relationships" xmlns:p="http://schemas.openxmlformats.org/presentationml/2006/main">
   <p:cSld>
     <p:spTree>
       <p:nvGrpSpPr>
@@ -31545,371 +32838,39 @@
           <a:chExt cx="0" cy="0"/>
         </a:xfrm>
       </p:grpSpPr>
-      <p:sp>
-        <p:nvSpPr>
-          <p:cNvPr id="13" name="Title 12"/>
-          <p:cNvSpPr>
-            <a:spLocks noGrp="1"/>
-          </p:cNvSpPr>
-          <p:nvPr>
-            <p:ph type="title"/>
-          </p:nvPr>
-        </p:nvSpPr>
-        <p:spPr>
-          <a:xfrm>
-            <a:off x="1940181" y="304799"/>
-            <a:ext cx="5248416" cy="1101969"/>
-          </a:xfrm>
-        </p:spPr>
-        <p:txBody>
-          <a:bodyPr/>
-          <a:lstStyle/>
-          <a:p>
-            <a:r>
-              <a:rPr lang="en-US" sz="3600" dirty="0" smtClean="0"/>
-              <a:t>Equivalence &amp; Validity</a:t>
-            </a:r>
-            <a:endParaRPr lang="en-US" sz="3600" dirty="0"/>
-          </a:p>
-        </p:txBody>
-      </p:sp>
-      <p:sp>
-        <p:nvSpPr>
-          <p:cNvPr id="14" name="TextBox 13"/>
-          <p:cNvSpPr txBox="1"/>
-          <p:nvPr/>
-        </p:nvSpPr>
-        <p:spPr>
-          <a:xfrm>
-            <a:off x="693500" y="2291127"/>
-            <a:ext cx="7782678" cy="1938992"/>
-          </a:xfrm>
-          <a:prstGeom prst="rect">
-            <a:avLst/>
-          </a:prstGeom>
-          <a:noFill/>
-        </p:spPr>
-        <p:txBody>
-          <a:bodyPr wrap="square" rtlCol="0">
-            <a:spAutoFit/>
-          </a:bodyPr>
-          <a:lstStyle/>
-          <a:p>
-            <a:pPr algn="l"/>
-            <a:r>
-              <a:rPr lang="en-US" sz="6000" dirty="0" smtClean="0">
-                <a:latin typeface="Comic Sans MS" pitchFamily="66" charset="0"/>
-              </a:rPr>
-              <a:t>A formula is </a:t>
-            </a:r>
-            <a:r>
-              <a:rPr lang="en-US" sz="6000" dirty="0" smtClean="0">
-                <a:solidFill>
-                  <a:schemeClr val="accent1">
-                    <a:lumMod val="50000"/>
-                  </a:schemeClr>
-                </a:solidFill>
-                <a:latin typeface="Comic Sans MS" pitchFamily="66" charset="0"/>
-              </a:rPr>
-              <a:t>valid </a:t>
-            </a:r>
-            <a:r>
-              <a:rPr lang="en-US" sz="6000" dirty="0" err="1" smtClean="0">
-                <a:latin typeface="Comic Sans MS" pitchFamily="66" charset="0"/>
-              </a:rPr>
-              <a:t>iff</a:t>
-            </a:r>
-            <a:endParaRPr lang="en-US" sz="6000" dirty="0" smtClean="0">
-              <a:latin typeface="Comic Sans MS" pitchFamily="66" charset="0"/>
-            </a:endParaRPr>
-          </a:p>
-          <a:p>
-            <a:pPr algn="l"/>
-            <a:r>
-              <a:rPr lang="en-US" sz="6000" dirty="0" smtClean="0">
-                <a:latin typeface="Comic Sans MS" pitchFamily="66" charset="0"/>
-              </a:rPr>
-              <a:t>it is equivalent to </a:t>
-            </a:r>
-            <a:r>
-              <a:rPr lang="en-US" sz="6000" dirty="0" smtClean="0">
-                <a:solidFill>
-                  <a:srgbClr val="008000"/>
-                </a:solidFill>
-                <a:latin typeface="Comic Sans MS" pitchFamily="66" charset="0"/>
-              </a:rPr>
-              <a:t>T</a:t>
-            </a:r>
-            <a:r>
-              <a:rPr lang="en-US" sz="6000" dirty="0" smtClean="0">
-                <a:latin typeface="Comic Sans MS" pitchFamily="66" charset="0"/>
-              </a:rPr>
-              <a:t>. </a:t>
-            </a:r>
-            <a:endParaRPr lang="en-US" sz="6000" dirty="0">
-              <a:latin typeface="Comic Sans MS" pitchFamily="66" charset="0"/>
-            </a:endParaRPr>
-          </a:p>
-        </p:txBody>
-      </p:sp>
-      <p:sp>
-        <p:nvSpPr>
-          <p:cNvPr id="8" name="Slide Number Placeholder 2"/>
-          <p:cNvSpPr>
-            <a:spLocks noGrp="1"/>
-          </p:cNvSpPr>
-          <p:nvPr>
-            <p:ph type="sldNum" sz="quarter" idx="10"/>
-          </p:nvPr>
-        </p:nvSpPr>
-        <p:spPr>
-          <a:xfrm>
-            <a:off x="8227765" y="6553200"/>
-            <a:ext cx="916236" cy="276999"/>
-          </a:xfrm>
-          <a:noFill/>
-        </p:spPr>
-        <p:txBody>
-          <a:bodyPr/>
-          <a:lstStyle/>
-          <a:p>
-            <a:r>
-              <a:rPr lang="en-US" dirty="0" err="1" smtClean="0"/>
-              <a:t>lec</a:t>
-            </a:r>
-            <a:r>
-              <a:rPr lang="en-US" dirty="0" smtClean="0"/>
-              <a:t> 2W.</a:t>
-            </a:r>
-            <a:fld id="{0150943C-9303-41DF-A6FA-7E32D6C5D18E}" type="slidenum">
-              <a:rPr lang="en-US" smtClean="0"/>
-              <a:pPr/>
-              <a:t>27</a:t>
-            </a:fld>
-            <a:endParaRPr lang="en-US" dirty="0" smtClean="0"/>
-          </a:p>
-        </p:txBody>
-      </p:sp>
-    </p:spTree>
-  </p:cSld>
-  <p:clrMapOvr>
-    <a:masterClrMapping/>
-  </p:clrMapOvr>
-  <p:transition xmlns:p14="http://schemas.microsoft.com/office/powerpoint/2010/main" spd="slow">
-    <p:fade thruBlk="1"/>
-  </p:transition>
-  <p:timing>
-    <p:tnLst>
-      <p:par>
-        <p:cTn xmlns:p14="http://schemas.microsoft.com/office/powerpoint/2010/main" id="1" dur="indefinite" restart="never" nodeType="tmRoot"/>
-      </p:par>
-    </p:tnLst>
-  </p:timing>
-</p:sld>
-</file>
-
-<file path=ppt/slides/slide28.xml><?xml version="1.0" encoding="utf-8"?>
-<p:sld xmlns:a="http://schemas.openxmlformats.org/drawingml/2006/main" xmlns:r="http://schemas.openxmlformats.org/officeDocument/2006/relationships" xmlns:p="http://schemas.openxmlformats.org/presentationml/2006/main" show="0">
-  <p:cSld>
-    <p:spTree>
-      <p:nvGrpSpPr>
-        <p:cNvPr id="1" name=""/>
-        <p:cNvGrpSpPr/>
-        <p:nvPr/>
-      </p:nvGrpSpPr>
-      <p:grpSpPr>
-        <a:xfrm>
-          <a:off x="0" y="0"/>
-          <a:ext cx="0" cy="0"/>
-          <a:chOff x="0" y="0"/>
-          <a:chExt cx="0" cy="0"/>
-        </a:xfrm>
-      </p:grpSpPr>
-      <p:sp>
-        <p:nvSpPr>
-          <p:cNvPr id="14" name="TextBox 13"/>
-          <p:cNvSpPr txBox="1"/>
-          <p:nvPr/>
-        </p:nvSpPr>
-        <p:spPr>
-          <a:xfrm>
-            <a:off x="256854" y="2147291"/>
-            <a:ext cx="8650840" cy="2416046"/>
-          </a:xfrm>
-          <a:prstGeom prst="rect">
-            <a:avLst/>
-          </a:prstGeom>
-          <a:noFill/>
-        </p:spPr>
-        <p:txBody>
-          <a:bodyPr wrap="square" rtlCol="0">
-            <a:spAutoFit/>
-          </a:bodyPr>
-          <a:lstStyle/>
-          <a:p>
-            <a:pPr algn="l">
-              <a:spcBef>
-                <a:spcPts val="1200"/>
-              </a:spcBef>
-            </a:pPr>
-            <a:r>
-              <a:rPr lang="en-US" sz="6000" dirty="0" smtClean="0">
-                <a:latin typeface="Comic Sans MS" pitchFamily="66" charset="0"/>
-              </a:rPr>
-              <a:t>Formula </a:t>
-            </a:r>
-            <a:r>
-              <a:rPr lang="en-US" sz="6600" dirty="0" smtClean="0">
-                <a:solidFill>
-                  <a:srgbClr val="BB0FAB"/>
-                </a:solidFill>
-                <a:latin typeface="Comic Sans MS" pitchFamily="66" charset="0"/>
-              </a:rPr>
-              <a:t>G</a:t>
-            </a:r>
-            <a:r>
-              <a:rPr lang="en-US" sz="6000" dirty="0" smtClean="0">
-                <a:solidFill>
-                  <a:srgbClr val="BB0FAB"/>
-                </a:solidFill>
-                <a:latin typeface="Comic Sans MS" pitchFamily="66" charset="0"/>
-              </a:rPr>
-              <a:t> is </a:t>
-            </a:r>
-            <a:r>
-              <a:rPr lang="en-US" sz="6000" dirty="0" err="1" smtClean="0">
-                <a:solidFill>
-                  <a:srgbClr val="BB0FAB"/>
-                </a:solidFill>
-                <a:latin typeface="Comic Sans MS" pitchFamily="66" charset="0"/>
-              </a:rPr>
-              <a:t>satisfiable</a:t>
-            </a:r>
-            <a:endParaRPr lang="en-US" sz="6000" dirty="0" smtClean="0">
-              <a:solidFill>
-                <a:srgbClr val="BB0FAB"/>
-              </a:solidFill>
-              <a:latin typeface="Comic Sans MS" pitchFamily="66" charset="0"/>
-            </a:endParaRPr>
-          </a:p>
-          <a:p>
-            <a:pPr algn="l">
-              <a:spcBef>
-                <a:spcPts val="3000"/>
-              </a:spcBef>
-            </a:pPr>
-            <a:r>
-              <a:rPr lang="en-US" sz="6000" dirty="0" smtClean="0">
-                <a:latin typeface="Comic Sans MS" pitchFamily="66" charset="0"/>
-              </a:rPr>
-              <a:t>       </a:t>
-            </a:r>
-            <a:r>
-              <a:rPr lang="en-US" sz="6000" dirty="0" err="1" smtClean="0">
-                <a:latin typeface="Comic Sans MS" pitchFamily="66" charset="0"/>
-              </a:rPr>
-              <a:t>iff</a:t>
-            </a:r>
-            <a:r>
-              <a:rPr lang="en-US" sz="6000" dirty="0" smtClean="0">
-                <a:latin typeface="Comic Sans MS" pitchFamily="66" charset="0"/>
-              </a:rPr>
-              <a:t>      </a:t>
-            </a:r>
-            <a:r>
-              <a:rPr lang="en-US" sz="6000" dirty="0" smtClean="0">
-                <a:solidFill>
-                  <a:schemeClr val="accent1">
-                    <a:lumMod val="50000"/>
-                  </a:schemeClr>
-                </a:solidFill>
-                <a:latin typeface="Comic Sans MS" pitchFamily="66" charset="0"/>
-              </a:rPr>
-              <a:t>is not valid</a:t>
-            </a:r>
-            <a:r>
-              <a:rPr lang="en-US" sz="6000" dirty="0" smtClean="0">
-                <a:latin typeface="Comic Sans MS" pitchFamily="66" charset="0"/>
-              </a:rPr>
-              <a:t>.</a:t>
-            </a:r>
-            <a:endParaRPr lang="en-US" sz="6000" dirty="0">
-              <a:latin typeface="Comic Sans MS" pitchFamily="66" charset="0"/>
-            </a:endParaRPr>
-          </a:p>
-        </p:txBody>
-      </p:sp>
-      <p:sp>
-        <p:nvSpPr>
-          <p:cNvPr id="8" name="Slide Number Placeholder 2"/>
-          <p:cNvSpPr>
-            <a:spLocks noGrp="1"/>
-          </p:cNvSpPr>
-          <p:nvPr>
-            <p:ph type="sldNum" sz="quarter" idx="10"/>
-          </p:nvPr>
-        </p:nvSpPr>
-        <p:spPr>
-          <a:xfrm>
-            <a:off x="8227765" y="6553200"/>
-            <a:ext cx="916236" cy="276999"/>
-          </a:xfrm>
-          <a:noFill/>
-        </p:spPr>
-        <p:txBody>
-          <a:bodyPr/>
-          <a:lstStyle/>
-          <a:p>
-            <a:r>
-              <a:rPr lang="en-US" dirty="0" err="1" smtClean="0"/>
-              <a:t>lec</a:t>
-            </a:r>
-            <a:r>
-              <a:rPr lang="en-US" dirty="0" smtClean="0"/>
-              <a:t> 2W.</a:t>
-            </a:r>
-            <a:fld id="{0150943C-9303-41DF-A6FA-7E32D6C5D18E}" type="slidenum">
-              <a:rPr lang="en-US" smtClean="0"/>
-              <a:pPr/>
-              <a:t>28</a:t>
-            </a:fld>
-            <a:endParaRPr lang="en-US" dirty="0" smtClean="0"/>
-          </a:p>
-        </p:txBody>
-      </p:sp>
       <p:graphicFrame>
         <p:nvGraphicFramePr>
-          <p:cNvPr id="5" name="Object 4"/>
+          <p:cNvPr id="18" name="Object 17"/>
           <p:cNvGraphicFramePr>
             <a:graphicFrameLocks noChangeAspect="1"/>
           </p:cNvGraphicFramePr>
           <p:nvPr/>
         </p:nvGraphicFramePr>
         <p:xfrm>
-          <a:off x="3156994" y="3101055"/>
-          <a:ext cx="983467" cy="1475201"/>
+          <a:off x="1050925" y="2292350"/>
+          <a:ext cx="6573837" cy="1054100"/>
         </p:xfrm>
         <a:graphic>
           <a:graphicData uri="http://schemas.openxmlformats.org/presentationml/2006/ole">
             <mc:AlternateContent xmlns:mc="http://schemas.openxmlformats.org/markup-compatibility/2006">
               <mc:Choice xmlns:v="urn:schemas-microsoft-com:vml" Requires="v">
-                <p:oleObj spid="_x0000_s359437" name="Equation" r:id="rId4" imgW="152280" imgH="228600" progId="Equation.DSMT4">
+                <p:oleObj spid="_x0000_s236571" name="Equation" r:id="rId5" imgW="1346040" imgH="215640" progId="Equation.DSMT4">
                   <p:embed/>
                 </p:oleObj>
               </mc:Choice>
               <mc:Fallback>
-                <p:oleObj name="Equation" r:id="rId4" imgW="152280" imgH="228600" progId="Equation.DSMT4">
+                <p:oleObj name="Equation" r:id="rId5" imgW="1346040" imgH="215640" progId="Equation.DSMT4">
                   <p:embed/>
                   <p:pic>
                     <p:nvPicPr>
-                      <p:cNvPr id="0" name="Picture 2"/>
+                      <p:cNvPr id="0" name="Picture 1"/>
                       <p:cNvPicPr>
                         <a:picLocks noChangeAspect="1" noChangeArrowheads="1"/>
                       </p:cNvPicPr>
                       <p:nvPr/>
                     </p:nvPicPr>
                     <p:blipFill>
-                      <a:blip r:embed="rId5">
+                      <a:blip r:embed="rId6">
                         <a:extLst>
                           <a:ext uri="{28A0092B-C50C-407E-A947-70E740481C1C}">
                             <a14:useLocalDpi xmlns:a14="http://schemas.microsoft.com/office/drawing/2010/main" val="0"/>
@@ -31923,8 +32884,8 @@
                     </p:blipFill>
                     <p:spPr bwMode="auto">
                       <a:xfrm>
-                        <a:off x="3156994" y="3101055"/>
-                        <a:ext cx="983467" cy="1475201"/>
+                        <a:off x="1050925" y="2292350"/>
+                        <a:ext cx="6573837" cy="1054100"/>
                       </a:xfrm>
                       <a:prstGeom prst="rect">
                         <a:avLst/>
@@ -31947,11 +32908,258 @@
           </a:graphicData>
         </a:graphic>
       </p:graphicFrame>
+      <p:graphicFrame>
+        <p:nvGraphicFramePr>
+          <p:cNvPr id="236546" name="Object 2"/>
+          <p:cNvGraphicFramePr>
+            <a:graphicFrameLocks noChangeAspect="1"/>
+          </p:cNvGraphicFramePr>
+          <p:nvPr/>
+        </p:nvGraphicFramePr>
+        <p:xfrm>
+          <a:off x="1062042" y="2290754"/>
+          <a:ext cx="6480175" cy="1111250"/>
+        </p:xfrm>
+        <a:graphic>
+          <a:graphicData uri="http://schemas.openxmlformats.org/presentationml/2006/ole">
+            <mc:AlternateContent xmlns:mc="http://schemas.openxmlformats.org/markup-compatibility/2006">
+              <mc:Choice xmlns:v="urn:schemas-microsoft-com:vml" Requires="v">
+                <p:oleObj spid="_x0000_s236572" name="Equation" r:id="rId7" imgW="1333500" imgH="228600" progId="Equation.DSMT4">
+                  <p:embed/>
+                </p:oleObj>
+              </mc:Choice>
+              <mc:Fallback>
+                <p:oleObj name="Equation" r:id="rId7" imgW="1333500" imgH="228600" progId="Equation.DSMT4">
+                  <p:embed/>
+                  <p:pic>
+                    <p:nvPicPr>
+                      <p:cNvPr id="0" name="Picture 2"/>
+                      <p:cNvPicPr>
+                        <a:picLocks noChangeAspect="1" noChangeArrowheads="1"/>
+                      </p:cNvPicPr>
+                      <p:nvPr/>
+                    </p:nvPicPr>
+                    <p:blipFill>
+                      <a:blip r:embed="rId8">
+                        <a:extLst>
+                          <a:ext uri="{28A0092B-C50C-407E-A947-70E740481C1C}">
+                            <a14:useLocalDpi xmlns:a14="http://schemas.microsoft.com/office/drawing/2010/main" val="0"/>
+                          </a:ext>
+                        </a:extLst>
+                      </a:blip>
+                      <a:srcRect/>
+                      <a:stretch>
+                        <a:fillRect/>
+                      </a:stretch>
+                    </p:blipFill>
+                    <p:spPr bwMode="auto">
+                      <a:xfrm>
+                        <a:off x="1062042" y="2290754"/>
+                        <a:ext cx="6480175" cy="1111250"/>
+                      </a:xfrm>
+                      <a:prstGeom prst="rect">
+                        <a:avLst/>
+                      </a:prstGeom>
+                      <a:solidFill>
+                        <a:schemeClr val="accent1"/>
+                      </a:solidFill>
+                    </p:spPr>
+                  </p:pic>
+                </p:oleObj>
+              </mc:Fallback>
+            </mc:AlternateContent>
+          </a:graphicData>
+        </a:graphic>
+      </p:graphicFrame>
       <p:sp>
         <p:nvSpPr>
-          <p:cNvPr id="7" name="Title 12"/>
+          <p:cNvPr id="259077" name="Text Box 5"/>
+          <p:cNvSpPr txBox="1">
+            <a:spLocks noChangeArrowheads="1"/>
+          </p:cNvSpPr>
+          <p:nvPr/>
+        </p:nvSpPr>
+        <p:spPr bwMode="auto">
+          <a:xfrm>
+            <a:off x="453933" y="4292548"/>
+            <a:ext cx="8247293" cy="1323439"/>
+          </a:xfrm>
+          <a:prstGeom prst="rect">
+            <a:avLst/>
+          </a:prstGeom>
+          <a:noFill/>
+          <a:ln w="9525" algn="ctr">
+            <a:noFill/>
+            <a:miter lim="800000"/>
+            <a:headEnd/>
+            <a:tailEnd/>
+          </a:ln>
+        </p:spPr>
+        <p:txBody>
+          <a:bodyPr wrap="square">
+            <a:spAutoFit/>
+          </a:bodyPr>
+          <a:lstStyle/>
+          <a:p>
+            <a:pPr>
+              <a:defRPr/>
+            </a:pPr>
+            <a:r>
+              <a:rPr lang="en-US" sz="4000" dirty="0">
+                <a:solidFill>
+                  <a:srgbClr val="008000"/>
+                </a:solidFill>
+                <a:latin typeface="Comic Sans MS" pitchFamily="66" charset="0"/>
+              </a:rPr>
+              <a:t>True</a:t>
+            </a:r>
+            <a:r>
+              <a:rPr lang="en-US" sz="4000" dirty="0">
+                <a:solidFill>
+                  <a:schemeClr val="tx1">
+                    <a:lumMod val="95000"/>
+                    <a:lumOff val="5000"/>
+                  </a:schemeClr>
+                </a:solidFill>
+                <a:latin typeface="Comic Sans MS" pitchFamily="66" charset="0"/>
+              </a:rPr>
+              <a:t> even if a Greek carries</a:t>
+            </a:r>
+            <a:r>
+              <a:rPr lang="en-US" sz="4000" i="1" dirty="0">
+                <a:solidFill>
+                  <a:schemeClr val="tx1">
+                    <a:lumMod val="95000"/>
+                    <a:lumOff val="5000"/>
+                  </a:schemeClr>
+                </a:solidFill>
+                <a:latin typeface="Comic Sans MS" pitchFamily="66" charset="0"/>
+              </a:rPr>
+              <a:t> </a:t>
+            </a:r>
+            <a:r>
+              <a:rPr lang="en-US" sz="4000" i="1" dirty="0" smtClean="0">
+                <a:solidFill>
+                  <a:schemeClr val="tx1">
+                    <a:lumMod val="95000"/>
+                    <a:lumOff val="5000"/>
+                  </a:schemeClr>
+                </a:solidFill>
+                <a:latin typeface="Comic Sans MS" pitchFamily="66" charset="0"/>
+              </a:rPr>
+              <a:t>both</a:t>
+            </a:r>
+          </a:p>
+          <a:p>
+            <a:pPr algn="ctr">
+              <a:defRPr/>
+            </a:pPr>
+            <a:r>
+              <a:rPr lang="en-US" sz="4000" dirty="0" smtClean="0">
+                <a:solidFill>
+                  <a:schemeClr val="tx1">
+                    <a:lumMod val="95000"/>
+                    <a:lumOff val="5000"/>
+                  </a:schemeClr>
+                </a:solidFill>
+                <a:latin typeface="Comic Sans MS" pitchFamily="66" charset="0"/>
+              </a:rPr>
+              <a:t>a Sword and a Javelin</a:t>
+            </a:r>
+            <a:endParaRPr lang="en-US" sz="4000" dirty="0">
+              <a:solidFill>
+                <a:schemeClr val="tx1">
+                  <a:lumMod val="95000"/>
+                  <a:lumOff val="5000"/>
+                </a:schemeClr>
+              </a:solidFill>
+              <a:latin typeface="Comic Sans MS" pitchFamily="66" charset="0"/>
+            </a:endParaRPr>
+          </a:p>
+        </p:txBody>
+      </p:sp>
+      <p:sp>
+        <p:nvSpPr>
+          <p:cNvPr id="13" name="TextBox 12"/>
+          <p:cNvSpPr txBox="1"/>
+          <p:nvPr/>
+        </p:nvSpPr>
+        <p:spPr>
+          <a:xfrm>
+            <a:off x="559899" y="1538151"/>
+            <a:ext cx="8002512" cy="707886"/>
+          </a:xfrm>
+          <a:prstGeom prst="rect">
+            <a:avLst/>
+          </a:prstGeom>
+          <a:noFill/>
+        </p:spPr>
+        <p:txBody>
+          <a:bodyPr wrap="none" rtlCol="0">
+            <a:spAutoFit/>
+          </a:bodyPr>
+          <a:lstStyle/>
+          <a:p>
+            <a:pPr lvl="0">
+              <a:spcBef>
+                <a:spcPct val="20000"/>
+              </a:spcBef>
+            </a:pPr>
+            <a:r>
+              <a:rPr lang="en-US" sz="4000" kern="0" dirty="0" smtClean="0">
+                <a:solidFill>
+                  <a:srgbClr val="000000"/>
+                </a:solidFill>
+                <a:latin typeface="Comic Sans MS" pitchFamily="66" charset="0"/>
+              </a:rPr>
+              <a:t>Greeks carry Swords or Javelins</a:t>
+            </a:r>
+            <a:endParaRPr lang="en-US" sz="3200" dirty="0"/>
+          </a:p>
+        </p:txBody>
+      </p:sp>
+      <p:sp>
+        <p:nvSpPr>
+          <p:cNvPr id="12" name="Slide Number Placeholder 2"/>
           <p:cNvSpPr>
             <a:spLocks noGrp="1"/>
+          </p:cNvSpPr>
+          <p:nvPr>
+            <p:ph type="sldNum" sz="quarter" idx="10"/>
+          </p:nvPr>
+        </p:nvSpPr>
+        <p:spPr>
+          <a:xfrm>
+            <a:off x="8318134" y="6553200"/>
+            <a:ext cx="825867" cy="276999"/>
+          </a:xfrm>
+        </p:spPr>
+        <p:txBody>
+          <a:bodyPr/>
+          <a:lstStyle/>
+          <a:p>
+            <a:r>
+              <a:rPr lang="en-US" dirty="0" err="1" smtClean="0"/>
+              <a:t>lec</a:t>
+            </a:r>
+            <a:r>
+              <a:rPr lang="en-US" dirty="0" smtClean="0"/>
+              <a:t> 2W.</a:t>
+            </a:r>
+            <a:fld id="{3251DA95-B240-47FE-901D-B78FC8E8E532}" type="slidenum">
+              <a:rPr lang="en-US" smtClean="0"/>
+              <a:pPr/>
+              <a:t>3</a:t>
+            </a:fld>
+            <a:endParaRPr lang="en-US" dirty="0"/>
+          </a:p>
+        </p:txBody>
+      </p:sp>
+      <p:sp>
+        <p:nvSpPr>
+          <p:cNvPr id="19" name="Rectangle 2"/>
+          <p:cNvSpPr>
+            <a:spLocks noGrp="1" noChangeArrowheads="1"/>
           </p:cNvSpPr>
           <p:nvPr>
             <p:ph type="title"/>
@@ -31959,36 +33167,33 @@
         </p:nvSpPr>
         <p:spPr>
           <a:xfrm>
-            <a:off x="1940180" y="304799"/>
-            <a:ext cx="5960647" cy="1113035"/>
+            <a:off x="2102537" y="290732"/>
+            <a:ext cx="4973509" cy="1158240"/>
           </a:xfrm>
         </p:spPr>
         <p:txBody>
           <a:bodyPr/>
           <a:lstStyle/>
           <a:p>
-            <a:r>
-              <a:rPr lang="en-US" sz="3600" dirty="0" err="1" smtClean="0"/>
-              <a:t>Vailidity</a:t>
-            </a:r>
-            <a:r>
-              <a:rPr lang="en-US" sz="3600" dirty="0" smtClean="0"/>
-              <a:t> &amp; </a:t>
-            </a:r>
-            <a:r>
-              <a:rPr lang="en-US" sz="3600" dirty="0" err="1" smtClean="0"/>
-              <a:t>Satisfiability</a:t>
-            </a:r>
-            <a:endParaRPr lang="en-US" sz="3600" dirty="0"/>
+            <a:pPr eaLnBrk="1" hangingPunct="1"/>
+            <a:r>
+              <a:rPr lang="en-US" dirty="0" smtClean="0"/>
+              <a:t>English to Math</a:t>
+            </a:r>
           </a:p>
         </p:txBody>
       </p:sp>
     </p:spTree>
+    <p:custDataLst>
+      <p:tags r:id="rId2"/>
+    </p:custDataLst>
   </p:cSld>
   <p:clrMapOvr>
     <a:masterClrMapping/>
   </p:clrMapOvr>
-  <p:transition xmlns:p14="http://schemas.microsoft.com/office/powerpoint/2010/main"/>
+  <p:transition xmlns:p14="http://schemas.microsoft.com/office/powerpoint/2010/main" advTm="88248">
+    <p:fade/>
+  </p:transition>
   <p:timing>
     <p:tnLst>
       <p:par>
@@ -32010,7 +33215,7 @@
                             </p:stCondLst>
                             <p:childTnLst>
                               <p:par>
-                                <p:cTn id="5" presetID="9" presetClass="entr" presetSubtype="0" fill="hold" nodeType="clickEffect">
+                                <p:cTn id="5" presetID="1" presetClass="entr" presetSubtype="0" fill="hold" nodeType="clickEffect">
                                   <p:stCondLst>
                                     <p:cond delay="0"/>
                                   </p:stCondLst>
@@ -32023,11 +33228,7 @@
                                           </p:stCondLst>
                                         </p:cTn>
                                         <p:tgtEl>
-                                          <p:spTgt spid="14">
-                                            <p:txEl>
-                                              <p:pRg st="0" end="0"/>
-                                            </p:txEl>
-                                          </p:spTgt>
+                                          <p:spTgt spid="18"/>
                                         </p:tgtEl>
                                         <p:attrNameLst>
                                           <p:attrName>style.visibility</p:attrName>
@@ -32037,40 +33238,95 @@
                                         <p:strVal val="visible"/>
                                       </p:to>
                                     </p:set>
-                                    <p:animEffect transition="in" filter="dissolve">
+                                  </p:childTnLst>
+                                </p:cTn>
+                              </p:par>
+                            </p:childTnLst>
+                          </p:cTn>
+                        </p:par>
+                      </p:childTnLst>
+                    </p:cTn>
+                  </p:par>
+                  <p:par>
+                    <p:cTn id="7" fill="hold">
+                      <p:stCondLst>
+                        <p:cond delay="indefinite"/>
+                      </p:stCondLst>
+                      <p:childTnLst>
+                        <p:par>
+                          <p:cTn id="8" fill="hold">
+                            <p:stCondLst>
+                              <p:cond delay="0"/>
+                            </p:stCondLst>
+                            <p:childTnLst>
+                              <p:par>
+                                <p:cTn id="9" presetID="10" presetClass="entr" presetSubtype="0" fill="hold" nodeType="clickEffect">
+                                  <p:stCondLst>
+                                    <p:cond delay="0"/>
+                                  </p:stCondLst>
+                                  <p:childTnLst>
+                                    <p:set>
                                       <p:cBhvr>
-                                        <p:cTn id="7" dur="500"/>
+                                        <p:cTn id="10" dur="1" fill="hold">
+                                          <p:stCondLst>
+                                            <p:cond delay="0"/>
+                                          </p:stCondLst>
+                                        </p:cTn>
                                         <p:tgtEl>
-                                          <p:spTgt spid="14">
-                                            <p:txEl>
-                                              <p:pRg st="0" end="0"/>
-                                            </p:txEl>
-                                          </p:spTgt>
+                                          <p:spTgt spid="236546"/>
+                                        </p:tgtEl>
+                                        <p:attrNameLst>
+                                          <p:attrName>style.visibility</p:attrName>
+                                        </p:attrNameLst>
+                                      </p:cBhvr>
+                                      <p:to>
+                                        <p:strVal val="visible"/>
+                                      </p:to>
+                                    </p:set>
+                                    <p:animEffect transition="in" filter="fade">
+                                      <p:cBhvr>
+                                        <p:cTn id="11" dur="1000"/>
+                                        <p:tgtEl>
+                                          <p:spTgt spid="236546"/>
                                         </p:tgtEl>
                                       </p:cBhvr>
                                     </p:animEffect>
                                   </p:childTnLst>
                                 </p:cTn>
                               </p:par>
+                            </p:childTnLst>
+                          </p:cTn>
+                        </p:par>
+                      </p:childTnLst>
+                    </p:cTn>
+                  </p:par>
+                  <p:par>
+                    <p:cTn id="12" fill="hold">
+                      <p:stCondLst>
+                        <p:cond delay="indefinite"/>
+                      </p:stCondLst>
+                      <p:childTnLst>
+                        <p:par>
+                          <p:cTn id="13" fill="hold">
+                            <p:stCondLst>
+                              <p:cond delay="0"/>
+                            </p:stCondLst>
+                            <p:childTnLst>
                               <p:par>
-                                <p:cTn id="8" presetID="1" presetClass="entr" presetSubtype="0" fill="hold" nodeType="withEffect">
+                                <p:cTn id="14" presetID="1" presetClass="entr" presetSubtype="0" fill="hold" grpId="0" nodeType="clickEffect">
                                   <p:stCondLst>
                                     <p:cond delay="0"/>
                                   </p:stCondLst>
                                   <p:childTnLst>
                                     <p:set>
                                       <p:cBhvr>
-                                        <p:cTn id="9" dur="1" fill="hold">
+                                        <p:cTn id="15" dur="1" fill="hold">
                                           <p:stCondLst>
                                             <p:cond delay="0"/>
                                           </p:stCondLst>
                                         </p:cTn>
                                         <p:tgtEl>
-                                          <p:spTgt spid="14">
-                                            <p:txEl>
-                                              <p:pRg st="1" end="1"/>
-                                            </p:txEl>
-                                          </p:spTgt>
+                                          <p:spTgt spid="259077"/>
                                         </p:tgtEl>
                                         <p:attrNameLst>
                                           <p:attrName>style.visibility</p:attrName>
@@ -32110,11 +33366,14 @@
         </p:cTn>
       </p:par>
     </p:tnLst>
+    <p:bldLst>
+      <p:bldP spid="259077" grpId="0"/>
+    </p:bldLst>
   </p:timing>
 </p:sld>
 </file>
 
-<file path=ppt/slides/slide29.xml><?xml version="1.0" encoding="utf-8"?>
+<file path=ppt/slides/slide30.xml><?xml version="1.0" encoding="utf-8"?>
 <p:sld xmlns:a="http://schemas.openxmlformats.org/drawingml/2006/main" xmlns:r="http://schemas.openxmlformats.org/officeDocument/2006/relationships" xmlns:p="http://schemas.openxmlformats.org/presentationml/2006/main" show="0">
   <p:cSld>
     <p:spTree>
@@ -33370,7 +34629,7 @@
             <a:fld id="{0150943C-9303-41DF-A6FA-7E32D6C5D18E}" type="slidenum">
               <a:rPr lang="en-US" smtClean="0"/>
               <a:pPr/>
-              <a:t>29</a:t>
+              <a:t>30</a:t>
             </a:fld>
             <a:endParaRPr lang="en-US" dirty="0" smtClean="0"/>
           </a:p>
@@ -33492,559 +34751,7 @@
 </p:sld>
 </file>
 
-<file path=ppt/slides/slide3.xml><?xml version="1.0" encoding="utf-8"?>
-<p:sld xmlns:a="http://schemas.openxmlformats.org/drawingml/2006/main" xmlns:r="http://schemas.openxmlformats.org/officeDocument/2006/relationships" xmlns:p="http://schemas.openxmlformats.org/presentationml/2006/main">
-  <p:cSld>
-    <p:spTree>
-      <p:nvGrpSpPr>
-        <p:cNvPr id="1" name=""/>
-        <p:cNvGrpSpPr/>
-        <p:nvPr/>
-      </p:nvGrpSpPr>
-      <p:grpSpPr>
-        <a:xfrm>
-          <a:off x="0" y="0"/>
-          <a:ext cx="0" cy="0"/>
-          <a:chOff x="0" y="0"/>
-          <a:chExt cx="0" cy="0"/>
-        </a:xfrm>
-      </p:grpSpPr>
-      <p:graphicFrame>
-        <p:nvGraphicFramePr>
-          <p:cNvPr id="18" name="Object 17"/>
-          <p:cNvGraphicFramePr>
-            <a:graphicFrameLocks noChangeAspect="1"/>
-          </p:cNvGraphicFramePr>
-          <p:nvPr/>
-        </p:nvGraphicFramePr>
-        <p:xfrm>
-          <a:off x="1050925" y="2292350"/>
-          <a:ext cx="6573837" cy="1054100"/>
-        </p:xfrm>
-        <a:graphic>
-          <a:graphicData uri="http://schemas.openxmlformats.org/presentationml/2006/ole">
-            <mc:AlternateContent xmlns:mc="http://schemas.openxmlformats.org/markup-compatibility/2006">
-              <mc:Choice xmlns:v="urn:schemas-microsoft-com:vml" Requires="v">
-                <p:oleObj spid="_x0000_s236564" name="Equation" r:id="rId5" imgW="1346040" imgH="215640" progId="Equation.DSMT4">
-                  <p:embed/>
-                </p:oleObj>
-              </mc:Choice>
-              <mc:Fallback>
-                <p:oleObj name="Equation" r:id="rId5" imgW="1346040" imgH="215640" progId="Equation.DSMT4">
-                  <p:embed/>
-                  <p:pic>
-                    <p:nvPicPr>
-                      <p:cNvPr id="0" name="Picture 1"/>
-                      <p:cNvPicPr>
-                        <a:picLocks noChangeAspect="1" noChangeArrowheads="1"/>
-                      </p:cNvPicPr>
-                      <p:nvPr/>
-                    </p:nvPicPr>
-                    <p:blipFill>
-                      <a:blip r:embed="rId6">
-                        <a:extLst>
-                          <a:ext uri="{28A0092B-C50C-407E-A947-70E740481C1C}">
-                            <a14:useLocalDpi xmlns:a14="http://schemas.microsoft.com/office/drawing/2010/main" val="0"/>
-                          </a:ext>
-                        </a:extLst>
-                      </a:blip>
-                      <a:srcRect/>
-                      <a:stretch>
-                        <a:fillRect/>
-                      </a:stretch>
-                    </p:blipFill>
-                    <p:spPr bwMode="auto">
-                      <a:xfrm>
-                        <a:off x="1050925" y="2292350"/>
-                        <a:ext cx="6573837" cy="1054100"/>
-                      </a:xfrm>
-                      <a:prstGeom prst="rect">
-                        <a:avLst/>
-                      </a:prstGeom>
-                      <a:noFill/>
-                      <a:extLst>
-                        <a:ext uri="{909E8E84-426E-40dd-AFC4-6F175D3DCCD1}">
-                          <a14:hiddenFill xmlns:a14="http://schemas.microsoft.com/office/drawing/2010/main">
-                            <a:solidFill>
-                              <a:srgbClr val="FFFFFF"/>
-                            </a:solidFill>
-                          </a14:hiddenFill>
-                        </a:ext>
-                      </a:extLst>
-                    </p:spPr>
-                  </p:pic>
-                </p:oleObj>
-              </mc:Fallback>
-            </mc:AlternateContent>
-          </a:graphicData>
-        </a:graphic>
-      </p:graphicFrame>
-      <p:graphicFrame>
-        <p:nvGraphicFramePr>
-          <p:cNvPr id="236546" name="Object 2"/>
-          <p:cNvGraphicFramePr>
-            <a:graphicFrameLocks noChangeAspect="1"/>
-          </p:cNvGraphicFramePr>
-          <p:nvPr/>
-        </p:nvGraphicFramePr>
-        <p:xfrm>
-          <a:off x="1062042" y="2290754"/>
-          <a:ext cx="6480175" cy="1111250"/>
-        </p:xfrm>
-        <a:graphic>
-          <a:graphicData uri="http://schemas.openxmlformats.org/presentationml/2006/ole">
-            <mc:AlternateContent xmlns:mc="http://schemas.openxmlformats.org/markup-compatibility/2006">
-              <mc:Choice xmlns:v="urn:schemas-microsoft-com:vml" Requires="v">
-                <p:oleObj spid="_x0000_s236565" name="Equation" r:id="rId7" imgW="1333500" imgH="228600" progId="Equation.DSMT4">
-                  <p:embed/>
-                </p:oleObj>
-              </mc:Choice>
-              <mc:Fallback>
-                <p:oleObj name="Equation" r:id="rId7" imgW="1333500" imgH="228600" progId="Equation.DSMT4">
-                  <p:embed/>
-                  <p:pic>
-                    <p:nvPicPr>
-                      <p:cNvPr id="0" name="Picture 2"/>
-                      <p:cNvPicPr>
-                        <a:picLocks noChangeAspect="1" noChangeArrowheads="1"/>
-                      </p:cNvPicPr>
-                      <p:nvPr/>
-                    </p:nvPicPr>
-                    <p:blipFill>
-                      <a:blip r:embed="rId8">
-                        <a:extLst>
-                          <a:ext uri="{28A0092B-C50C-407E-A947-70E740481C1C}">
-                            <a14:useLocalDpi xmlns:a14="http://schemas.microsoft.com/office/drawing/2010/main" val="0"/>
-                          </a:ext>
-                        </a:extLst>
-                      </a:blip>
-                      <a:srcRect/>
-                      <a:stretch>
-                        <a:fillRect/>
-                      </a:stretch>
-                    </p:blipFill>
-                    <p:spPr bwMode="auto">
-                      <a:xfrm>
-                        <a:off x="1062042" y="2290754"/>
-                        <a:ext cx="6480175" cy="1111250"/>
-                      </a:xfrm>
-                      <a:prstGeom prst="rect">
-                        <a:avLst/>
-                      </a:prstGeom>
-                      <a:solidFill>
-                        <a:schemeClr val="accent1"/>
-                      </a:solidFill>
-                    </p:spPr>
-                  </p:pic>
-                </p:oleObj>
-              </mc:Fallback>
-            </mc:AlternateContent>
-          </a:graphicData>
-        </a:graphic>
-      </p:graphicFrame>
-      <p:sp>
-        <p:nvSpPr>
-          <p:cNvPr id="259077" name="Text Box 5"/>
-          <p:cNvSpPr txBox="1">
-            <a:spLocks noChangeArrowheads="1"/>
-          </p:cNvSpPr>
-          <p:nvPr/>
-        </p:nvSpPr>
-        <p:spPr bwMode="auto">
-          <a:xfrm>
-            <a:off x="453933" y="4292548"/>
-            <a:ext cx="8247293" cy="1323439"/>
-          </a:xfrm>
-          <a:prstGeom prst="rect">
-            <a:avLst/>
-          </a:prstGeom>
-          <a:noFill/>
-          <a:ln w="9525" algn="ctr">
-            <a:noFill/>
-            <a:miter lim="800000"/>
-            <a:headEnd/>
-            <a:tailEnd/>
-          </a:ln>
-        </p:spPr>
-        <p:txBody>
-          <a:bodyPr wrap="square">
-            <a:spAutoFit/>
-          </a:bodyPr>
-          <a:lstStyle/>
-          <a:p>
-            <a:pPr>
-              <a:defRPr/>
-            </a:pPr>
-            <a:r>
-              <a:rPr lang="en-US" sz="4000" dirty="0">
-                <a:solidFill>
-                  <a:srgbClr val="008000"/>
-                </a:solidFill>
-                <a:latin typeface="Comic Sans MS" pitchFamily="66" charset="0"/>
-              </a:rPr>
-              <a:t>True</a:t>
-            </a:r>
-            <a:r>
-              <a:rPr lang="en-US" sz="4000" dirty="0">
-                <a:solidFill>
-                  <a:schemeClr val="tx1">
-                    <a:lumMod val="95000"/>
-                    <a:lumOff val="5000"/>
-                  </a:schemeClr>
-                </a:solidFill>
-                <a:latin typeface="Comic Sans MS" pitchFamily="66" charset="0"/>
-              </a:rPr>
-              <a:t> even if a Greek carries</a:t>
-            </a:r>
-            <a:r>
-              <a:rPr lang="en-US" sz="4000" i="1" dirty="0">
-                <a:solidFill>
-                  <a:schemeClr val="tx1">
-                    <a:lumMod val="95000"/>
-                    <a:lumOff val="5000"/>
-                  </a:schemeClr>
-                </a:solidFill>
-                <a:latin typeface="Comic Sans MS" pitchFamily="66" charset="0"/>
-              </a:rPr>
-              <a:t> </a:t>
-            </a:r>
-            <a:r>
-              <a:rPr lang="en-US" sz="4000" i="1" dirty="0" smtClean="0">
-                <a:solidFill>
-                  <a:schemeClr val="tx1">
-                    <a:lumMod val="95000"/>
-                    <a:lumOff val="5000"/>
-                  </a:schemeClr>
-                </a:solidFill>
-                <a:latin typeface="Comic Sans MS" pitchFamily="66" charset="0"/>
-              </a:rPr>
-              <a:t>both</a:t>
-            </a:r>
-          </a:p>
-          <a:p>
-            <a:pPr algn="ctr">
-              <a:defRPr/>
-            </a:pPr>
-            <a:r>
-              <a:rPr lang="en-US" sz="4000" dirty="0" smtClean="0">
-                <a:solidFill>
-                  <a:schemeClr val="tx1">
-                    <a:lumMod val="95000"/>
-                    <a:lumOff val="5000"/>
-                  </a:schemeClr>
-                </a:solidFill>
-                <a:latin typeface="Comic Sans MS" pitchFamily="66" charset="0"/>
-              </a:rPr>
-              <a:t>a Sword and a Javelin</a:t>
-            </a:r>
-            <a:endParaRPr lang="en-US" sz="4000" dirty="0">
-              <a:solidFill>
-                <a:schemeClr val="tx1">
-                  <a:lumMod val="95000"/>
-                  <a:lumOff val="5000"/>
-                </a:schemeClr>
-              </a:solidFill>
-              <a:latin typeface="Comic Sans MS" pitchFamily="66" charset="0"/>
-            </a:endParaRPr>
-          </a:p>
-        </p:txBody>
-      </p:sp>
-      <p:sp>
-        <p:nvSpPr>
-          <p:cNvPr id="13" name="TextBox 12"/>
-          <p:cNvSpPr txBox="1"/>
-          <p:nvPr/>
-        </p:nvSpPr>
-        <p:spPr>
-          <a:xfrm>
-            <a:off x="559899" y="1538151"/>
-            <a:ext cx="8002512" cy="707886"/>
-          </a:xfrm>
-          <a:prstGeom prst="rect">
-            <a:avLst/>
-          </a:prstGeom>
-          <a:noFill/>
-        </p:spPr>
-        <p:txBody>
-          <a:bodyPr wrap="none" rtlCol="0">
-            <a:spAutoFit/>
-          </a:bodyPr>
-          <a:lstStyle/>
-          <a:p>
-            <a:pPr lvl="0">
-              <a:spcBef>
-                <a:spcPct val="20000"/>
-              </a:spcBef>
-            </a:pPr>
-            <a:r>
-              <a:rPr lang="en-US" sz="4000" kern="0" dirty="0" smtClean="0">
-                <a:solidFill>
-                  <a:srgbClr val="000000"/>
-                </a:solidFill>
-                <a:latin typeface="Comic Sans MS" pitchFamily="66" charset="0"/>
-              </a:rPr>
-              <a:t>Greeks carry Swords or Javelins</a:t>
-            </a:r>
-            <a:endParaRPr lang="en-US" sz="3200" dirty="0"/>
-          </a:p>
-        </p:txBody>
-      </p:sp>
-      <p:sp>
-        <p:nvSpPr>
-          <p:cNvPr id="12" name="Slide Number Placeholder 2"/>
-          <p:cNvSpPr>
-            <a:spLocks noGrp="1"/>
-          </p:cNvSpPr>
-          <p:nvPr>
-            <p:ph type="sldNum" sz="quarter" idx="10"/>
-          </p:nvPr>
-        </p:nvSpPr>
-        <p:spPr>
-          <a:xfrm>
-            <a:off x="8318134" y="6553200"/>
-            <a:ext cx="825867" cy="276999"/>
-          </a:xfrm>
-        </p:spPr>
-        <p:txBody>
-          <a:bodyPr/>
-          <a:lstStyle/>
-          <a:p>
-            <a:r>
-              <a:rPr lang="en-US" dirty="0" err="1" smtClean="0"/>
-              <a:t>lec</a:t>
-            </a:r>
-            <a:r>
-              <a:rPr lang="en-US" dirty="0" smtClean="0"/>
-              <a:t> 2W.</a:t>
-            </a:r>
-            <a:fld id="{3251DA95-B240-47FE-901D-B78FC8E8E532}" type="slidenum">
-              <a:rPr lang="en-US" smtClean="0"/>
-              <a:pPr/>
-              <a:t>3</a:t>
-            </a:fld>
-            <a:endParaRPr lang="en-US" dirty="0"/>
-          </a:p>
-        </p:txBody>
-      </p:sp>
-      <p:sp>
-        <p:nvSpPr>
-          <p:cNvPr id="19" name="Rectangle 2"/>
-          <p:cNvSpPr>
-            <a:spLocks noGrp="1" noChangeArrowheads="1"/>
-          </p:cNvSpPr>
-          <p:nvPr>
-            <p:ph type="title"/>
-          </p:nvPr>
-        </p:nvSpPr>
-        <p:spPr>
-          <a:xfrm>
-            <a:off x="2102537" y="290732"/>
-            <a:ext cx="4973509" cy="1158240"/>
-          </a:xfrm>
-        </p:spPr>
-        <p:txBody>
-          <a:bodyPr/>
-          <a:lstStyle/>
-          <a:p>
-            <a:pPr eaLnBrk="1" hangingPunct="1"/>
-            <a:r>
-              <a:rPr lang="en-US" dirty="0" smtClean="0"/>
-              <a:t>English to Math</a:t>
-            </a:r>
-          </a:p>
-        </p:txBody>
-      </p:sp>
-    </p:spTree>
-    <p:custDataLst>
-      <p:tags r:id="rId2"/>
-    </p:custDataLst>
-  </p:cSld>
-  <p:clrMapOvr>
-    <a:masterClrMapping/>
-  </p:clrMapOvr>
-  <p:transition xmlns:p14="http://schemas.microsoft.com/office/powerpoint/2010/main" advTm="88248">
-    <p:fade/>
-  </p:transition>
-  <p:timing>
-    <p:tnLst>
-      <p:par>
-        <p:cTn xmlns:p14="http://schemas.microsoft.com/office/powerpoint/2010/main" id="1" dur="indefinite" restart="never" nodeType="tmRoot">
-          <p:childTnLst>
-            <p:seq concurrent="1" nextAc="seek">
-              <p:cTn id="2" dur="indefinite" nodeType="mainSeq">
-                <p:childTnLst>
-                  <p:par>
-                    <p:cTn id="3" fill="hold">
-                      <p:stCondLst>
-                        <p:cond delay="indefinite"/>
-                      </p:stCondLst>
-                      <p:childTnLst>
-                        <p:par>
-                          <p:cTn id="4" fill="hold">
-                            <p:stCondLst>
-                              <p:cond delay="0"/>
-                            </p:stCondLst>
-                            <p:childTnLst>
-                              <p:par>
-                                <p:cTn id="5" presetID="1" presetClass="entr" presetSubtype="0" fill="hold" nodeType="clickEffect">
-                                  <p:stCondLst>
-                                    <p:cond delay="0"/>
-                                  </p:stCondLst>
-                                  <p:childTnLst>
-                                    <p:set>
-                                      <p:cBhvr>
-                                        <p:cTn id="6" dur="1" fill="hold">
-                                          <p:stCondLst>
-                                            <p:cond delay="0"/>
-                                          </p:stCondLst>
-                                        </p:cTn>
-                                        <p:tgtEl>
-                                          <p:spTgt spid="18"/>
-                                        </p:tgtEl>
-                                        <p:attrNameLst>
-                                          <p:attrName>style.visibility</p:attrName>
-                                        </p:attrNameLst>
-                                      </p:cBhvr>
-                                      <p:to>
-                                        <p:strVal val="visible"/>
-                                      </p:to>
-                                    </p:set>
-                                  </p:childTnLst>
-                                </p:cTn>
-                              </p:par>
-                            </p:childTnLst>
-                          </p:cTn>
-                        </p:par>
-                      </p:childTnLst>
-                    </p:cTn>
-                  </p:par>
-                  <p:par>
-                    <p:cTn id="7" fill="hold">
-                      <p:stCondLst>
-                        <p:cond delay="indefinite"/>
-                      </p:stCondLst>
-                      <p:childTnLst>
-                        <p:par>
-                          <p:cTn id="8" fill="hold">
-                            <p:stCondLst>
-                              <p:cond delay="0"/>
-                            </p:stCondLst>
-                            <p:childTnLst>
-                              <p:par>
-                                <p:cTn id="9" presetID="10" presetClass="entr" presetSubtype="0" fill="hold" nodeType="clickEffect">
-                                  <p:stCondLst>
-                                    <p:cond delay="0"/>
-                                  </p:stCondLst>
-                                  <p:childTnLst>
-                                    <p:set>
-                                      <p:cBhvr>
-                                        <p:cTn id="10" dur="1" fill="hold">
-                                          <p:stCondLst>
-                                            <p:cond delay="0"/>
-                                          </p:stCondLst>
-                                        </p:cTn>
-                                        <p:tgtEl>
-                                          <p:spTgt spid="236546"/>
-                                        </p:tgtEl>
-                                        <p:attrNameLst>
-                                          <p:attrName>style.visibility</p:attrName>
-                                        </p:attrNameLst>
-                                      </p:cBhvr>
-                                      <p:to>
-                                        <p:strVal val="visible"/>
-                                      </p:to>
-                                    </p:set>
-                                    <p:animEffect transition="in" filter="fade">
-                                      <p:cBhvr>
-                                        <p:cTn id="11" dur="1000"/>
-                                        <p:tgtEl>
-                                          <p:spTgt spid="236546"/>
-                                        </p:tgtEl>
-                                      </p:cBhvr>
-                                    </p:animEffect>
-                                  </p:childTnLst>
-                                </p:cTn>
-                              </p:par>
-                            </p:childTnLst>
-                          </p:cTn>
-                        </p:par>
-                      </p:childTnLst>
-                    </p:cTn>
-                  </p:par>
-                  <p:par>
-                    <p:cTn id="12" fill="hold">
-                      <p:stCondLst>
-                        <p:cond delay="indefinite"/>
-                      </p:stCondLst>
-                      <p:childTnLst>
-                        <p:par>
-                          <p:cTn id="13" fill="hold">
-                            <p:stCondLst>
-                              <p:cond delay="0"/>
-                            </p:stCondLst>
-                            <p:childTnLst>
-                              <p:par>
-                                <p:cTn id="14" presetID="1" presetClass="entr" presetSubtype="0" fill="hold" grpId="0" nodeType="clickEffect">
-                                  <p:stCondLst>
-                                    <p:cond delay="0"/>
-                                  </p:stCondLst>
-                                  <p:childTnLst>
-                                    <p:set>
-                                      <p:cBhvr>
-                                        <p:cTn id="15" dur="1" fill="hold">
-                                          <p:stCondLst>
-                                            <p:cond delay="0"/>
-                                          </p:stCondLst>
-                                        </p:cTn>
-                                        <p:tgtEl>
-                                          <p:spTgt spid="259077"/>
-                                        </p:tgtEl>
-                                        <p:attrNameLst>
-                                          <p:attrName>style.visibility</p:attrName>
-                                        </p:attrNameLst>
-                                      </p:cBhvr>
-                                      <p:to>
-                                        <p:strVal val="visible"/>
-                                      </p:to>
-                                    </p:set>
-                                  </p:childTnLst>
-                                </p:cTn>
-                              </p:par>
-                            </p:childTnLst>
-                          </p:cTn>
-                        </p:par>
-                      </p:childTnLst>
-                    </p:cTn>
-                  </p:par>
-                </p:childTnLst>
-              </p:cTn>
-              <p:prevCondLst>
-                <p:cond evt="onPrev" delay="0">
-                  <p:tgtEl>
-                    <p:sldTgt/>
-                  </p:tgtEl>
-                </p:cond>
-              </p:prevCondLst>
-              <p:nextCondLst>
-                <p:cond evt="onNext" delay="0">
-                  <p:tgtEl>
-                    <p:sldTgt/>
-                  </p:tgtEl>
-                </p:cond>
-              </p:nextCondLst>
-            </p:seq>
-          </p:childTnLst>
-        </p:cTn>
-      </p:par>
-    </p:tnLst>
-    <p:bldLst>
-      <p:bldP spid="259077" grpId="0"/>
-    </p:bldLst>
-  </p:timing>
-</p:sld>
-</file>
-
-<file path=ppt/slides/slide30.xml><?xml version="1.0" encoding="utf-8"?>
+<file path=ppt/slides/slide31.xml><?xml version="1.0" encoding="utf-8"?>
 <p:sld xmlns:a="http://schemas.openxmlformats.org/drawingml/2006/main" xmlns:r="http://schemas.openxmlformats.org/officeDocument/2006/relationships" xmlns:p="http://schemas.openxmlformats.org/presentationml/2006/main" show="0">
   <p:cSld>
     <p:spTree>
@@ -34129,7 +34836,7 @@
               <a:pPr>
                 <a:defRPr/>
               </a:pPr>
-              <a:t>30</a:t>
+              <a:t>31</a:t>
             </a:fld>
             <a:endParaRPr lang="en-US" dirty="0"/>
           </a:p>
@@ -34227,232 +34934,6 @@
                 <a:latin typeface="Comic Sans MS" pitchFamily="66" charset="0"/>
               </a:rPr>
               <a:t> </a:t>
-            </a:r>
-          </a:p>
-        </p:txBody>
-      </p:sp>
-    </p:spTree>
-  </p:cSld>
-  <p:clrMapOvr>
-    <a:masterClrMapping/>
-  </p:clrMapOvr>
-  <p:transition xmlns:p14="http://schemas.microsoft.com/office/powerpoint/2010/main">
-    <p:fade/>
-  </p:transition>
-  <p:timing>
-    <p:tnLst>
-      <p:par>
-        <p:cTn xmlns:p14="http://schemas.microsoft.com/office/powerpoint/2010/main" id="1" dur="indefinite" restart="never" nodeType="tmRoot"/>
-      </p:par>
-    </p:tnLst>
-  </p:timing>
-</p:sld>
-</file>
-
-<file path=ppt/slides/slide31.xml><?xml version="1.0" encoding="utf-8"?>
-<p:sld xmlns:a="http://schemas.openxmlformats.org/drawingml/2006/main" xmlns:r="http://schemas.openxmlformats.org/officeDocument/2006/relationships" xmlns:p="http://schemas.openxmlformats.org/presentationml/2006/main" show="0">
-  <p:cSld>
-    <p:spTree>
-      <p:nvGrpSpPr>
-        <p:cNvPr id="1" name=""/>
-        <p:cNvGrpSpPr/>
-        <p:nvPr/>
-      </p:nvGrpSpPr>
-      <p:grpSpPr>
-        <a:xfrm>
-          <a:off x="0" y="0"/>
-          <a:ext cx="0" cy="0"/>
-          <a:chOff x="0" y="0"/>
-          <a:chExt cx="0" cy="0"/>
-        </a:xfrm>
-      </p:grpSpPr>
-      <p:sp>
-        <p:nvSpPr>
-          <p:cNvPr id="3" name="Slide Number Placeholder 2"/>
-          <p:cNvSpPr>
-            <a:spLocks noGrp="1"/>
-          </p:cNvSpPr>
-          <p:nvPr>
-            <p:ph type="sldNum" sz="quarter" idx="10"/>
-          </p:nvPr>
-        </p:nvSpPr>
-        <p:spPr>
-          <a:xfrm>
-            <a:off x="8227768" y="6553200"/>
-            <a:ext cx="916236" cy="276999"/>
-          </a:xfrm>
-        </p:spPr>
-        <p:txBody>
-          <a:bodyPr/>
-          <a:lstStyle/>
-          <a:p>
-            <a:pPr>
-              <a:defRPr/>
-            </a:pPr>
-            <a:r>
-              <a:rPr lang="en-US" dirty="0" err="1" smtClean="0"/>
-              <a:t>lec</a:t>
-            </a:r>
-            <a:r>
-              <a:rPr lang="en-US" dirty="0" smtClean="0"/>
-              <a:t> 2W.</a:t>
-            </a:r>
-            <a:fld id="{DB6F0ED6-FEF5-4C9C-B1CC-29B47EC66FAA}" type="slidenum">
-              <a:rPr lang="en-US" smtClean="0"/>
-              <a:pPr>
-                <a:defRPr/>
-              </a:pPr>
-              <a:t>31</a:t>
-            </a:fld>
-            <a:endParaRPr lang="en-US" dirty="0"/>
-          </a:p>
-        </p:txBody>
-      </p:sp>
-      <p:sp>
-        <p:nvSpPr>
-          <p:cNvPr id="4" name="Title 1"/>
-          <p:cNvSpPr>
-            <a:spLocks noGrp="1"/>
-          </p:cNvSpPr>
-          <p:nvPr>
-            <p:ph type="title"/>
-          </p:nvPr>
-        </p:nvSpPr>
-        <p:spPr>
-          <a:xfrm>
-            <a:off x="1580158" y="268704"/>
-            <a:ext cx="6685537" cy="1151022"/>
-          </a:xfrm>
-        </p:spPr>
-        <p:txBody>
-          <a:bodyPr/>
-          <a:lstStyle/>
-          <a:p>
-            <a:r>
-              <a:rPr lang="en-US" i="1" dirty="0" smtClean="0"/>
-              <a:t>Quickie: </a:t>
-            </a:r>
-            <a:r>
-              <a:rPr lang="en-US" dirty="0" smtClean="0"/>
-              <a:t>SAT versus VALID</a:t>
-            </a:r>
-            <a:endParaRPr lang="en-US" dirty="0"/>
-          </a:p>
-        </p:txBody>
-      </p:sp>
-      <p:sp>
-        <p:nvSpPr>
-          <p:cNvPr id="5" name="TextBox 4"/>
-          <p:cNvSpPr txBox="1"/>
-          <p:nvPr/>
-        </p:nvSpPr>
-        <p:spPr>
-          <a:xfrm>
-            <a:off x="481777" y="1994664"/>
-            <a:ext cx="8174033" cy="2862322"/>
-          </a:xfrm>
-          <a:prstGeom prst="rect">
-            <a:avLst/>
-          </a:prstGeom>
-          <a:noFill/>
-        </p:spPr>
-        <p:txBody>
-          <a:bodyPr wrap="none" rtlCol="0">
-            <a:spAutoFit/>
-          </a:bodyPr>
-          <a:lstStyle/>
-          <a:p>
-            <a:pPr algn="l"/>
-            <a:r>
-              <a:rPr lang="en-US" sz="6000" dirty="0" smtClean="0">
-                <a:latin typeface="Comic Sans MS" pitchFamily="66" charset="0"/>
-              </a:rPr>
-              <a:t>To test if </a:t>
-            </a:r>
-            <a:r>
-              <a:rPr lang="en-US" sz="6000" dirty="0" smtClean="0">
-                <a:solidFill>
-                  <a:schemeClr val="accent5">
-                    <a:lumMod val="50000"/>
-                  </a:schemeClr>
-                </a:solidFill>
-                <a:latin typeface="Comic Sans MS" pitchFamily="66" charset="0"/>
-              </a:rPr>
-              <a:t>G</a:t>
-            </a:r>
-            <a:r>
-              <a:rPr lang="en-US" sz="6000" dirty="0" smtClean="0">
-                <a:latin typeface="Comic Sans MS" pitchFamily="66" charset="0"/>
-              </a:rPr>
-              <a:t> is </a:t>
-            </a:r>
-            <a:r>
-              <a:rPr lang="en-US" sz="6000" dirty="0" smtClean="0">
-                <a:solidFill>
-                  <a:srgbClr val="00B050"/>
-                </a:solidFill>
-                <a:latin typeface="Comic Sans MS" pitchFamily="66" charset="0"/>
-              </a:rPr>
-              <a:t>VALID</a:t>
-            </a:r>
-            <a:r>
-              <a:rPr lang="en-US" sz="6000" dirty="0" smtClean="0">
-                <a:latin typeface="Comic Sans MS" pitchFamily="66" charset="0"/>
-              </a:rPr>
-              <a:t>,</a:t>
-            </a:r>
-          </a:p>
-          <a:p>
-            <a:pPr algn="l"/>
-            <a:r>
-              <a:rPr lang="en-US" sz="6000" dirty="0" smtClean="0">
-                <a:latin typeface="Comic Sans MS" pitchFamily="66" charset="0"/>
-              </a:rPr>
-              <a:t>check that</a:t>
-            </a:r>
-          </a:p>
-          <a:p>
-            <a:pPr algn="l"/>
-            <a:r>
-              <a:rPr lang="en-US" sz="6000" dirty="0" smtClean="0">
-                <a:solidFill>
-                  <a:schemeClr val="accent5">
-                    <a:lumMod val="50000"/>
-                  </a:schemeClr>
-                </a:solidFill>
-                <a:latin typeface="Comic Sans MS" pitchFamily="66" charset="0"/>
-              </a:rPr>
-              <a:t>NOT(G)</a:t>
-            </a:r>
-            <a:r>
-              <a:rPr lang="en-US" sz="6000" dirty="0" smtClean="0">
-                <a:latin typeface="Comic Sans MS" pitchFamily="66" charset="0"/>
-              </a:rPr>
-              <a:t> is </a:t>
-            </a:r>
-            <a:r>
-              <a:rPr lang="en-US" sz="6000" dirty="0" smtClean="0">
-                <a:solidFill>
-                  <a:srgbClr val="FF0000"/>
-                </a:solidFill>
-                <a:latin typeface="Comic Sans MS" pitchFamily="66" charset="0"/>
-              </a:rPr>
-              <a:t>not</a:t>
-            </a:r>
-            <a:r>
-              <a:rPr lang="en-US" sz="6000" dirty="0" smtClean="0">
-                <a:solidFill>
-                  <a:srgbClr val="00B050"/>
-                </a:solidFill>
-                <a:latin typeface="Comic Sans MS" pitchFamily="66" charset="0"/>
-              </a:rPr>
-              <a:t> SAT</a:t>
-            </a:r>
-            <a:r>
-              <a:rPr lang="en-US" sz="6000" dirty="0" smtClean="0">
-                <a:latin typeface="Comic Sans MS" pitchFamily="66" charset="0"/>
-              </a:rPr>
-              <a:t>.</a:t>
             </a:r>
           </a:p>
         </p:txBody>
@@ -34494,6 +34975,232 @@
       </p:grpSpPr>
       <p:sp>
         <p:nvSpPr>
+          <p:cNvPr id="3" name="Slide Number Placeholder 2"/>
+          <p:cNvSpPr>
+            <a:spLocks noGrp="1"/>
+          </p:cNvSpPr>
+          <p:nvPr>
+            <p:ph type="sldNum" sz="quarter" idx="10"/>
+          </p:nvPr>
+        </p:nvSpPr>
+        <p:spPr>
+          <a:xfrm>
+            <a:off x="8227768" y="6553200"/>
+            <a:ext cx="916236" cy="276999"/>
+          </a:xfrm>
+        </p:spPr>
+        <p:txBody>
+          <a:bodyPr/>
+          <a:lstStyle/>
+          <a:p>
+            <a:pPr>
+              <a:defRPr/>
+            </a:pPr>
+            <a:r>
+              <a:rPr lang="en-US" dirty="0" err="1" smtClean="0"/>
+              <a:t>lec</a:t>
+            </a:r>
+            <a:r>
+              <a:rPr lang="en-US" dirty="0" smtClean="0"/>
+              <a:t> 2W.</a:t>
+            </a:r>
+            <a:fld id="{DB6F0ED6-FEF5-4C9C-B1CC-29B47EC66FAA}" type="slidenum">
+              <a:rPr lang="en-US" smtClean="0"/>
+              <a:pPr>
+                <a:defRPr/>
+              </a:pPr>
+              <a:t>32</a:t>
+            </a:fld>
+            <a:endParaRPr lang="en-US" dirty="0"/>
+          </a:p>
+        </p:txBody>
+      </p:sp>
+      <p:sp>
+        <p:nvSpPr>
+          <p:cNvPr id="4" name="Title 1"/>
+          <p:cNvSpPr>
+            <a:spLocks noGrp="1"/>
+          </p:cNvSpPr>
+          <p:nvPr>
+            <p:ph type="title"/>
+          </p:nvPr>
+        </p:nvSpPr>
+        <p:spPr>
+          <a:xfrm>
+            <a:off x="1580158" y="268704"/>
+            <a:ext cx="6685537" cy="1151022"/>
+          </a:xfrm>
+        </p:spPr>
+        <p:txBody>
+          <a:bodyPr/>
+          <a:lstStyle/>
+          <a:p>
+            <a:r>
+              <a:rPr lang="en-US" i="1" dirty="0" smtClean="0"/>
+              <a:t>Quickie: </a:t>
+            </a:r>
+            <a:r>
+              <a:rPr lang="en-US" dirty="0" smtClean="0"/>
+              <a:t>SAT versus VALID</a:t>
+            </a:r>
+            <a:endParaRPr lang="en-US" dirty="0"/>
+          </a:p>
+        </p:txBody>
+      </p:sp>
+      <p:sp>
+        <p:nvSpPr>
+          <p:cNvPr id="5" name="TextBox 4"/>
+          <p:cNvSpPr txBox="1"/>
+          <p:nvPr/>
+        </p:nvSpPr>
+        <p:spPr>
+          <a:xfrm>
+            <a:off x="481777" y="1994664"/>
+            <a:ext cx="8174033" cy="2862322"/>
+          </a:xfrm>
+          <a:prstGeom prst="rect">
+            <a:avLst/>
+          </a:prstGeom>
+          <a:noFill/>
+        </p:spPr>
+        <p:txBody>
+          <a:bodyPr wrap="none" rtlCol="0">
+            <a:spAutoFit/>
+          </a:bodyPr>
+          <a:lstStyle/>
+          <a:p>
+            <a:pPr algn="l"/>
+            <a:r>
+              <a:rPr lang="en-US" sz="6000" dirty="0" smtClean="0">
+                <a:latin typeface="Comic Sans MS" pitchFamily="66" charset="0"/>
+              </a:rPr>
+              <a:t>To test if </a:t>
+            </a:r>
+            <a:r>
+              <a:rPr lang="en-US" sz="6000" dirty="0" smtClean="0">
+                <a:solidFill>
+                  <a:schemeClr val="accent5">
+                    <a:lumMod val="50000"/>
+                  </a:schemeClr>
+                </a:solidFill>
+                <a:latin typeface="Comic Sans MS" pitchFamily="66" charset="0"/>
+              </a:rPr>
+              <a:t>G</a:t>
+            </a:r>
+            <a:r>
+              <a:rPr lang="en-US" sz="6000" dirty="0" smtClean="0">
+                <a:latin typeface="Comic Sans MS" pitchFamily="66" charset="0"/>
+              </a:rPr>
+              <a:t> is </a:t>
+            </a:r>
+            <a:r>
+              <a:rPr lang="en-US" sz="6000" dirty="0" smtClean="0">
+                <a:solidFill>
+                  <a:srgbClr val="00B050"/>
+                </a:solidFill>
+                <a:latin typeface="Comic Sans MS" pitchFamily="66" charset="0"/>
+              </a:rPr>
+              <a:t>VALID</a:t>
+            </a:r>
+            <a:r>
+              <a:rPr lang="en-US" sz="6000" dirty="0" smtClean="0">
+                <a:latin typeface="Comic Sans MS" pitchFamily="66" charset="0"/>
+              </a:rPr>
+              <a:t>,</a:t>
+            </a:r>
+          </a:p>
+          <a:p>
+            <a:pPr algn="l"/>
+            <a:r>
+              <a:rPr lang="en-US" sz="6000" dirty="0" smtClean="0">
+                <a:latin typeface="Comic Sans MS" pitchFamily="66" charset="0"/>
+              </a:rPr>
+              <a:t>check that</a:t>
+            </a:r>
+          </a:p>
+          <a:p>
+            <a:pPr algn="l"/>
+            <a:r>
+              <a:rPr lang="en-US" sz="6000" dirty="0" smtClean="0">
+                <a:solidFill>
+                  <a:schemeClr val="accent5">
+                    <a:lumMod val="50000"/>
+                  </a:schemeClr>
+                </a:solidFill>
+                <a:latin typeface="Comic Sans MS" pitchFamily="66" charset="0"/>
+              </a:rPr>
+              <a:t>NOT(G)</a:t>
+            </a:r>
+            <a:r>
+              <a:rPr lang="en-US" sz="6000" dirty="0" smtClean="0">
+                <a:latin typeface="Comic Sans MS" pitchFamily="66" charset="0"/>
+              </a:rPr>
+              <a:t> is </a:t>
+            </a:r>
+            <a:r>
+              <a:rPr lang="en-US" sz="6000" dirty="0" smtClean="0">
+                <a:solidFill>
+                  <a:srgbClr val="FF0000"/>
+                </a:solidFill>
+                <a:latin typeface="Comic Sans MS" pitchFamily="66" charset="0"/>
+              </a:rPr>
+              <a:t>not</a:t>
+            </a:r>
+            <a:r>
+              <a:rPr lang="en-US" sz="6000" dirty="0" smtClean="0">
+                <a:solidFill>
+                  <a:srgbClr val="00B050"/>
+                </a:solidFill>
+                <a:latin typeface="Comic Sans MS" pitchFamily="66" charset="0"/>
+              </a:rPr>
+              <a:t> SAT</a:t>
+            </a:r>
+            <a:r>
+              <a:rPr lang="en-US" sz="6000" dirty="0" smtClean="0">
+                <a:latin typeface="Comic Sans MS" pitchFamily="66" charset="0"/>
+              </a:rPr>
+              <a:t>.</a:t>
+            </a:r>
+          </a:p>
+        </p:txBody>
+      </p:sp>
+    </p:spTree>
+  </p:cSld>
+  <p:clrMapOvr>
+    <a:masterClrMapping/>
+  </p:clrMapOvr>
+  <p:transition xmlns:p14="http://schemas.microsoft.com/office/powerpoint/2010/main">
+    <p:fade/>
+  </p:transition>
+  <p:timing>
+    <p:tnLst>
+      <p:par>
+        <p:cTn xmlns:p14="http://schemas.microsoft.com/office/powerpoint/2010/main" id="1" dur="indefinite" restart="never" nodeType="tmRoot"/>
+      </p:par>
+    </p:tnLst>
+  </p:timing>
+</p:sld>
+</file>
+
+<file path=ppt/slides/slide33.xml><?xml version="1.0" encoding="utf-8"?>
+<p:sld xmlns:a="http://schemas.openxmlformats.org/drawingml/2006/main" xmlns:r="http://schemas.openxmlformats.org/officeDocument/2006/relationships" xmlns:p="http://schemas.openxmlformats.org/presentationml/2006/main" show="0">
+  <p:cSld>
+    <p:spTree>
+      <p:nvGrpSpPr>
+        <p:cNvPr id="1" name=""/>
+        <p:cNvGrpSpPr/>
+        <p:nvPr/>
+      </p:nvGrpSpPr>
+      <p:grpSpPr>
+        <a:xfrm>
+          <a:off x="0" y="0"/>
+          <a:ext cx="0" cy="0"/>
+          <a:chOff x="0" y="0"/>
+          <a:chExt cx="0" cy="0"/>
+        </a:xfrm>
+      </p:grpSpPr>
+      <p:sp>
+        <p:nvSpPr>
           <p:cNvPr id="5" name="TextBox 4"/>
           <p:cNvSpPr txBox="1"/>
           <p:nvPr/>
@@ -34600,7 +35307,7 @@
 </p:sld>
 </file>
 
-<file path=ppt/slides/slide33.xml><?xml version="1.0" encoding="utf-8"?>
+<file path=ppt/slides/slide34.xml><?xml version="1.0" encoding="utf-8"?>
 <p:sld xmlns:a="http://schemas.openxmlformats.org/drawingml/2006/main" xmlns:r="http://schemas.openxmlformats.org/officeDocument/2006/relationships" xmlns:p="http://schemas.openxmlformats.org/presentationml/2006/main" show="0">
   <p:cSld>
     <p:spTree>
@@ -35247,7 +35954,7 @@
 </p:sld>
 </file>
 
-<file path=ppt/slides/slide34.xml><?xml version="1.0" encoding="utf-8"?>
+<file path=ppt/slides/slide35.xml><?xml version="1.0" encoding="utf-8"?>
 <p:sld xmlns:a="http://schemas.openxmlformats.org/drawingml/2006/main" xmlns:r="http://schemas.openxmlformats.org/officeDocument/2006/relationships" xmlns:p="http://schemas.openxmlformats.org/presentationml/2006/main" show="0">
   <p:cSld>
     <p:spTree>
@@ -35391,7 +36098,7 @@
 </p:sld>
 </file>
 
-<file path=ppt/slides/slide35.xml><?xml version="1.0" encoding="utf-8"?>
+<file path=ppt/slides/slide36.xml><?xml version="1.0" encoding="utf-8"?>
 <p:sld xmlns:a="http://schemas.openxmlformats.org/drawingml/2006/main" xmlns:r="http://schemas.openxmlformats.org/officeDocument/2006/relationships" xmlns:p="http://schemas.openxmlformats.org/presentationml/2006/main" show="0">
   <p:cSld>
     <p:spTree>
@@ -36042,7 +36749,7 @@
 </p:sld>
 </file>
 
-<file path=ppt/slides/slide36.xml><?xml version="1.0" encoding="utf-8"?>
+<file path=ppt/slides/slide37.xml><?xml version="1.0" encoding="utf-8"?>
 <p:sld xmlns:a="http://schemas.openxmlformats.org/drawingml/2006/main" xmlns:r="http://schemas.openxmlformats.org/officeDocument/2006/relationships" xmlns:p="http://schemas.openxmlformats.org/presentationml/2006/main" show="0">
   <p:cSld>
     <p:spTree>
@@ -36826,7 +37533,7 @@
 </p:sld>
 </file>
 
-<file path=ppt/slides/slide37.xml><?xml version="1.0" encoding="utf-8"?>
+<file path=ppt/slides/slide38.xml><?xml version="1.0" encoding="utf-8"?>
 <p:sld xmlns:a="http://schemas.openxmlformats.org/drawingml/2006/main" xmlns:r="http://schemas.openxmlformats.org/officeDocument/2006/relationships" xmlns:p="http://schemas.openxmlformats.org/presentationml/2006/main" show="0">
   <p:cSld>
     <p:spTree>
@@ -37424,7 +38131,7 @@
 </p:sld>
 </file>
 
-<file path=ppt/slides/slide38.xml><?xml version="1.0" encoding="utf-8"?>
+<file path=ppt/slides/slide39.xml><?xml version="1.0" encoding="utf-8"?>
 <p:sld xmlns:a="http://schemas.openxmlformats.org/drawingml/2006/main" xmlns:r="http://schemas.openxmlformats.org/officeDocument/2006/relationships" xmlns:p="http://schemas.openxmlformats.org/presentationml/2006/main" show="0">
   <p:cSld>
     <p:spTree>
@@ -37904,184 +38611,6 @@
 </p:sld>
 </file>
 
-<file path=ppt/slides/slide39.xml><?xml version="1.0" encoding="utf-8"?>
-<p:sld xmlns:a="http://schemas.openxmlformats.org/drawingml/2006/main" xmlns:r="http://schemas.openxmlformats.org/officeDocument/2006/relationships" xmlns:p="http://schemas.openxmlformats.org/presentationml/2006/main" show="0">
-  <p:cSld>
-    <p:spTree>
-      <p:nvGrpSpPr>
-        <p:cNvPr id="1" name=""/>
-        <p:cNvGrpSpPr/>
-        <p:nvPr/>
-      </p:nvGrpSpPr>
-      <p:grpSpPr>
-        <a:xfrm>
-          <a:off x="0" y="0"/>
-          <a:ext cx="0" cy="0"/>
-          <a:chOff x="0" y="0"/>
-          <a:chExt cx="0" cy="0"/>
-        </a:xfrm>
-      </p:grpSpPr>
-      <p:sp>
-        <p:nvSpPr>
-          <p:cNvPr id="13" name="Title 12"/>
-          <p:cNvSpPr>
-            <a:spLocks noGrp="1"/>
-          </p:cNvSpPr>
-          <p:nvPr>
-            <p:ph type="title"/>
-          </p:nvPr>
-        </p:nvSpPr>
-        <p:spPr/>
-        <p:txBody>
-          <a:bodyPr/>
-          <a:lstStyle/>
-          <a:p>
-            <a:r>
-              <a:rPr lang="en-US" sz="4000" dirty="0" smtClean="0"/>
-              <a:t>Soundness &amp; Validity</a:t>
-            </a:r>
-            <a:endParaRPr lang="en-US" sz="4000" dirty="0"/>
-          </a:p>
-        </p:txBody>
-      </p:sp>
-      <p:sp>
-        <p:nvSpPr>
-          <p:cNvPr id="14" name="TextBox 13"/>
-          <p:cNvSpPr txBox="1"/>
-          <p:nvPr/>
-        </p:nvSpPr>
-        <p:spPr>
-          <a:xfrm>
-            <a:off x="111181" y="1675812"/>
-            <a:ext cx="8921637" cy="2308324"/>
-          </a:xfrm>
-          <a:prstGeom prst="rect">
-            <a:avLst/>
-          </a:prstGeom>
-          <a:noFill/>
-        </p:spPr>
-        <p:txBody>
-          <a:bodyPr wrap="square" rtlCol="0">
-            <a:spAutoFit/>
-          </a:bodyPr>
-          <a:lstStyle/>
-          <a:p>
-            <a:pPr algn="l"/>
-            <a:r>
-              <a:rPr lang="en-US" sz="4000" i="1" dirty="0" smtClean="0">
-                <a:latin typeface="Comic Sans MS" pitchFamily="66" charset="0"/>
-              </a:rPr>
-              <a:t>Lemma:</a:t>
-            </a:r>
-            <a:r>
-              <a:rPr lang="en-US" sz="4400" dirty="0" smtClean="0">
-                <a:latin typeface="Comic Sans MS" pitchFamily="66" charset="0"/>
-              </a:rPr>
-              <a:t> A r</a:t>
-            </a:r>
-            <a:r>
-              <a:rPr lang="en-US" sz="4800" dirty="0" smtClean="0">
-                <a:latin typeface="Comic Sans MS" pitchFamily="66" charset="0"/>
-              </a:rPr>
-              <a:t>ule is sound </a:t>
-            </a:r>
-            <a:r>
-              <a:rPr lang="en-US" sz="4800" dirty="0" err="1" smtClean="0">
-                <a:latin typeface="Comic Sans MS" pitchFamily="66" charset="0"/>
-              </a:rPr>
-              <a:t>iff</a:t>
-            </a:r>
-            <a:endParaRPr lang="en-US" sz="4800" dirty="0" smtClean="0">
-              <a:latin typeface="Comic Sans MS" pitchFamily="66" charset="0"/>
-            </a:endParaRPr>
-          </a:p>
-          <a:p>
-            <a:pPr algn="l"/>
-            <a:r>
-              <a:rPr lang="en-US" sz="4400" dirty="0" smtClean="0">
-                <a:solidFill>
-                  <a:schemeClr val="accent1">
-                    <a:lumMod val="50000"/>
-                  </a:schemeClr>
-                </a:solidFill>
-                <a:latin typeface="Comic Sans MS" pitchFamily="66" charset="0"/>
-              </a:rPr>
-              <a:t> </a:t>
-            </a:r>
-            <a:r>
-              <a:rPr lang="en-US" sz="4400" dirty="0" smtClean="0">
-                <a:solidFill>
-                  <a:srgbClr val="0000FF"/>
-                </a:solidFill>
-                <a:latin typeface="Comic Sans MS" pitchFamily="66" charset="0"/>
-              </a:rPr>
-              <a:t>AND{antecedents}</a:t>
-            </a:r>
-            <a:r>
-              <a:rPr lang="en-US" sz="4800" b="1" dirty="0" smtClean="0">
-                <a:solidFill>
-                  <a:srgbClr val="0000FF"/>
-                </a:solidFill>
-                <a:latin typeface="Comic Sans MS" pitchFamily="66" charset="0"/>
-                <a:sym typeface="Euclid Symbol"/>
-              </a:rPr>
-              <a:t></a:t>
-            </a:r>
-            <a:r>
-              <a:rPr lang="en-US" sz="4800" dirty="0" smtClean="0">
-                <a:solidFill>
-                  <a:srgbClr val="0000FF"/>
-                </a:solidFill>
-                <a:latin typeface="Comic Sans MS" pitchFamily="66" charset="0"/>
-                <a:sym typeface="Euclid Symbol"/>
-              </a:rPr>
-              <a:t>conclusion</a:t>
-            </a:r>
-          </a:p>
-          <a:p>
-            <a:pPr algn="l"/>
-            <a:r>
-              <a:rPr lang="en-US" sz="4800" dirty="0" smtClean="0">
-                <a:latin typeface="Comic Sans MS" pitchFamily="66" charset="0"/>
-              </a:rPr>
-              <a:t>is </a:t>
-            </a:r>
-            <a:r>
-              <a:rPr lang="en-US" sz="4800" dirty="0" smtClean="0">
-                <a:solidFill>
-                  <a:srgbClr val="006600"/>
-                </a:solidFill>
-                <a:latin typeface="Comic Sans MS" pitchFamily="66" charset="0"/>
-              </a:rPr>
-              <a:t>valid</a:t>
-            </a:r>
-            <a:r>
-              <a:rPr lang="en-US" sz="4800" dirty="0" smtClean="0">
-                <a:latin typeface="Comic Sans MS" pitchFamily="66" charset="0"/>
-              </a:rPr>
-              <a:t>.</a:t>
-            </a:r>
-          </a:p>
-        </p:txBody>
-      </p:sp>
-    </p:spTree>
-  </p:cSld>
-  <p:clrMapOvr>
-    <a:masterClrMapping/>
-  </p:clrMapOvr>
-  <p:transition xmlns:p14="http://schemas.microsoft.com/office/powerpoint/2010/main">
-    <p:fade/>
-  </p:transition>
-  <p:timing>
-    <p:tnLst>
-      <p:par>
-        <p:cTn xmlns:p14="http://schemas.microsoft.com/office/powerpoint/2010/main" id="1" dur="indefinite" restart="never" nodeType="tmRoot"/>
-      </p:par>
-    </p:tnLst>
-  </p:timing>
-</p:sld>
-</file>
-
 <file path=ppt/slides/slide4.xml><?xml version="1.0" encoding="utf-8"?>
 <p:sld xmlns:a="http://schemas.openxmlformats.org/drawingml/2006/main" xmlns:r="http://schemas.openxmlformats.org/officeDocument/2006/relationships" xmlns:p="http://schemas.openxmlformats.org/presentationml/2006/main">
   <p:cSld>
@@ -38115,7 +38644,7 @@
           <a:graphicData uri="http://schemas.openxmlformats.org/presentationml/2006/ole">
             <mc:AlternateContent xmlns:mc="http://schemas.openxmlformats.org/markup-compatibility/2006">
               <mc:Choice xmlns:v="urn:schemas-microsoft-com:vml" Requires="v">
-                <p:oleObj spid="_x0000_s234518" name="Equation" r:id="rId5" imgW="1422360" imgH="215640" progId="Equation.DSMT4">
+                <p:oleObj spid="_x0000_s234525" name="Equation" r:id="rId5" imgW="1422360" imgH="215640" progId="Equation.DSMT4">
                   <p:embed/>
                 </p:oleObj>
               </mc:Choice>
@@ -38185,7 +38714,7 @@
           <a:graphicData uri="http://schemas.openxmlformats.org/presentationml/2006/ole">
             <mc:AlternateContent xmlns:mc="http://schemas.openxmlformats.org/markup-compatibility/2006">
               <mc:Choice xmlns:v="urn:schemas-microsoft-com:vml" Requires="v">
-                <p:oleObj spid="_x0000_s234519" name="Equation" r:id="rId7" imgW="1409700" imgH="228600" progId="Equation.DSMT4">
+                <p:oleObj spid="_x0000_s234526" name="Equation" r:id="rId7" imgW="1409700" imgH="228600" progId="Equation.DSMT4">
                   <p:embed/>
                 </p:oleObj>
               </mc:Choice>
@@ -38614,6 +39143,184 @@
       </p:grpSpPr>
       <p:sp>
         <p:nvSpPr>
+          <p:cNvPr id="13" name="Title 12"/>
+          <p:cNvSpPr>
+            <a:spLocks noGrp="1"/>
+          </p:cNvSpPr>
+          <p:nvPr>
+            <p:ph type="title"/>
+          </p:nvPr>
+        </p:nvSpPr>
+        <p:spPr/>
+        <p:txBody>
+          <a:bodyPr/>
+          <a:lstStyle/>
+          <a:p>
+            <a:r>
+              <a:rPr lang="en-US" sz="4000" dirty="0" smtClean="0"/>
+              <a:t>Soundness &amp; Validity</a:t>
+            </a:r>
+            <a:endParaRPr lang="en-US" sz="4000" dirty="0"/>
+          </a:p>
+        </p:txBody>
+      </p:sp>
+      <p:sp>
+        <p:nvSpPr>
+          <p:cNvPr id="14" name="TextBox 13"/>
+          <p:cNvSpPr txBox="1"/>
+          <p:nvPr/>
+        </p:nvSpPr>
+        <p:spPr>
+          <a:xfrm>
+            <a:off x="111181" y="1675812"/>
+            <a:ext cx="8921637" cy="2308324"/>
+          </a:xfrm>
+          <a:prstGeom prst="rect">
+            <a:avLst/>
+          </a:prstGeom>
+          <a:noFill/>
+        </p:spPr>
+        <p:txBody>
+          <a:bodyPr wrap="square" rtlCol="0">
+            <a:spAutoFit/>
+          </a:bodyPr>
+          <a:lstStyle/>
+          <a:p>
+            <a:pPr algn="l"/>
+            <a:r>
+              <a:rPr lang="en-US" sz="4000" i="1" dirty="0" smtClean="0">
+                <a:latin typeface="Comic Sans MS" pitchFamily="66" charset="0"/>
+              </a:rPr>
+              <a:t>Lemma:</a:t>
+            </a:r>
+            <a:r>
+              <a:rPr lang="en-US" sz="4400" dirty="0" smtClean="0">
+                <a:latin typeface="Comic Sans MS" pitchFamily="66" charset="0"/>
+              </a:rPr>
+              <a:t> A r</a:t>
+            </a:r>
+            <a:r>
+              <a:rPr lang="en-US" sz="4800" dirty="0" smtClean="0">
+                <a:latin typeface="Comic Sans MS" pitchFamily="66" charset="0"/>
+              </a:rPr>
+              <a:t>ule is sound </a:t>
+            </a:r>
+            <a:r>
+              <a:rPr lang="en-US" sz="4800" dirty="0" err="1" smtClean="0">
+                <a:latin typeface="Comic Sans MS" pitchFamily="66" charset="0"/>
+              </a:rPr>
+              <a:t>iff</a:t>
+            </a:r>
+            <a:endParaRPr lang="en-US" sz="4800" dirty="0" smtClean="0">
+              <a:latin typeface="Comic Sans MS" pitchFamily="66" charset="0"/>
+            </a:endParaRPr>
+          </a:p>
+          <a:p>
+            <a:pPr algn="l"/>
+            <a:r>
+              <a:rPr lang="en-US" sz="4400" dirty="0" smtClean="0">
+                <a:solidFill>
+                  <a:schemeClr val="accent1">
+                    <a:lumMod val="50000"/>
+                  </a:schemeClr>
+                </a:solidFill>
+                <a:latin typeface="Comic Sans MS" pitchFamily="66" charset="0"/>
+              </a:rPr>
+              <a:t> </a:t>
+            </a:r>
+            <a:r>
+              <a:rPr lang="en-US" sz="4400" dirty="0" smtClean="0">
+                <a:solidFill>
+                  <a:srgbClr val="0000FF"/>
+                </a:solidFill>
+                <a:latin typeface="Comic Sans MS" pitchFamily="66" charset="0"/>
+              </a:rPr>
+              <a:t>AND{antecedents}</a:t>
+            </a:r>
+            <a:r>
+              <a:rPr lang="en-US" sz="4800" b="1" dirty="0" smtClean="0">
+                <a:solidFill>
+                  <a:srgbClr val="0000FF"/>
+                </a:solidFill>
+                <a:latin typeface="Comic Sans MS" pitchFamily="66" charset="0"/>
+                <a:sym typeface="Euclid Symbol"/>
+              </a:rPr>
+              <a:t></a:t>
+            </a:r>
+            <a:r>
+              <a:rPr lang="en-US" sz="4800" dirty="0" smtClean="0">
+                <a:solidFill>
+                  <a:srgbClr val="0000FF"/>
+                </a:solidFill>
+                <a:latin typeface="Comic Sans MS" pitchFamily="66" charset="0"/>
+                <a:sym typeface="Euclid Symbol"/>
+              </a:rPr>
+              <a:t>conclusion</a:t>
+            </a:r>
+          </a:p>
+          <a:p>
+            <a:pPr algn="l"/>
+            <a:r>
+              <a:rPr lang="en-US" sz="4800" dirty="0" smtClean="0">
+                <a:latin typeface="Comic Sans MS" pitchFamily="66" charset="0"/>
+              </a:rPr>
+              <a:t>is </a:t>
+            </a:r>
+            <a:r>
+              <a:rPr lang="en-US" sz="4800" dirty="0" smtClean="0">
+                <a:solidFill>
+                  <a:srgbClr val="006600"/>
+                </a:solidFill>
+                <a:latin typeface="Comic Sans MS" pitchFamily="66" charset="0"/>
+              </a:rPr>
+              <a:t>valid</a:t>
+            </a:r>
+            <a:r>
+              <a:rPr lang="en-US" sz="4800" dirty="0" smtClean="0">
+                <a:latin typeface="Comic Sans MS" pitchFamily="66" charset="0"/>
+              </a:rPr>
+              <a:t>.</a:t>
+            </a:r>
+          </a:p>
+        </p:txBody>
+      </p:sp>
+    </p:spTree>
+  </p:cSld>
+  <p:clrMapOvr>
+    <a:masterClrMapping/>
+  </p:clrMapOvr>
+  <p:transition xmlns:p14="http://schemas.microsoft.com/office/powerpoint/2010/main">
+    <p:fade/>
+  </p:transition>
+  <p:timing>
+    <p:tnLst>
+      <p:par>
+        <p:cTn xmlns:p14="http://schemas.microsoft.com/office/powerpoint/2010/main" id="1" dur="indefinite" restart="never" nodeType="tmRoot"/>
+      </p:par>
+    </p:tnLst>
+  </p:timing>
+</p:sld>
+</file>
+
+<file path=ppt/slides/slide41.xml><?xml version="1.0" encoding="utf-8"?>
+<p:sld xmlns:a="http://schemas.openxmlformats.org/drawingml/2006/main" xmlns:r="http://schemas.openxmlformats.org/officeDocument/2006/relationships" xmlns:p="http://schemas.openxmlformats.org/presentationml/2006/main" show="0">
+  <p:cSld>
+    <p:spTree>
+      <p:nvGrpSpPr>
+        <p:cNvPr id="1" name=""/>
+        <p:cNvGrpSpPr/>
+        <p:nvPr/>
+      </p:nvGrpSpPr>
+      <p:grpSpPr>
+        <a:xfrm>
+          <a:off x="0" y="0"/>
+          <a:ext cx="0" cy="0"/>
+          <a:chOff x="0" y="0"/>
+          <a:chExt cx="0" cy="0"/>
+        </a:xfrm>
+      </p:grpSpPr>
+      <p:sp>
+        <p:nvSpPr>
           <p:cNvPr id="2" name="Title 1"/>
           <p:cNvSpPr>
             <a:spLocks noGrp="1"/>
@@ -38828,7 +39535,7 @@
 </p:sld>
 </file>
 
-<file path=ppt/slides/slide41.xml><?xml version="1.0" encoding="utf-8"?>
+<file path=ppt/slides/slide42.xml><?xml version="1.0" encoding="utf-8"?>
 <p:sld xmlns:a="http://schemas.openxmlformats.org/drawingml/2006/main" xmlns:r="http://schemas.openxmlformats.org/officeDocument/2006/relationships" xmlns:p="http://schemas.openxmlformats.org/presentationml/2006/main">
   <p:cSld>
     <p:spTree>
@@ -38974,7 +39681,7 @@
             <a:fld id="{3251DA95-B240-47FE-901D-B78FC8E8E532}" type="slidenum">
               <a:rPr lang="en-US" smtClean="0"/>
               <a:pPr/>
-              <a:t>41</a:t>
+              <a:t>42</a:t>
             </a:fld>
             <a:endParaRPr lang="en-US" dirty="0"/>
           </a:p>
@@ -39288,7 +39995,7 @@
 </p:sld>
 </file>
 
-<file path=ppt/slides/slide42.xml><?xml version="1.0" encoding="utf-8"?>
+<file path=ppt/slides/slide43.xml><?xml version="1.0" encoding="utf-8"?>
 <p:sld xmlns:a="http://schemas.openxmlformats.org/drawingml/2006/main" xmlns:r="http://schemas.openxmlformats.org/officeDocument/2006/relationships" xmlns:p="http://schemas.openxmlformats.org/presentationml/2006/main" show="0">
   <p:cSld>
     <p:spTree>
@@ -39337,7 +40044,7 @@
             <a:fld id="{0150943C-9303-41DF-A6FA-7E32D6C5D18E}" type="slidenum">
               <a:rPr lang="en-US" smtClean="0"/>
               <a:pPr/>
-              <a:t>42</a:t>
+              <a:t>43</a:t>
             </a:fld>
             <a:endParaRPr lang="en-US" dirty="0" smtClean="0"/>
           </a:p>
@@ -39387,7 +40094,7 @@
           <a:graphicData uri="http://schemas.openxmlformats.org/presentationml/2006/ole">
             <mc:AlternateContent xmlns:mc="http://schemas.openxmlformats.org/markup-compatibility/2006">
               <mc:Choice xmlns:v="urn:schemas-microsoft-com:vml" Requires="v">
-                <p:oleObj spid="_x0000_s338957" name="Equation" r:id="rId4" imgW="939600" imgH="1130040" progId="Equation.DSMT4">
+                <p:oleObj spid="_x0000_s338961" name="Equation" r:id="rId4" imgW="939600" imgH="1130040" progId="Equation.DSMT4">
                   <p:embed/>
                 </p:oleObj>
               </mc:Choice>
@@ -39459,7 +40166,7 @@
 </p:sld>
 </file>
 
-<file path=ppt/slides/slide43.xml><?xml version="1.0" encoding="utf-8"?>
+<file path=ppt/slides/slide44.xml><?xml version="1.0" encoding="utf-8"?>
 <p:sld xmlns:a="http://schemas.openxmlformats.org/drawingml/2006/main" xmlns:r="http://schemas.openxmlformats.org/officeDocument/2006/relationships" xmlns:p="http://schemas.openxmlformats.org/presentationml/2006/main">
   <p:cSld>
     <p:spTree>
@@ -39662,7 +40369,7 @@
             <a:fld id="{0150943C-9303-41DF-A6FA-7E32D6C5D18E}" type="slidenum">
               <a:rPr lang="en-US" smtClean="0"/>
               <a:pPr/>
-              <a:t>43</a:t>
+              <a:t>44</a:t>
             </a:fld>
             <a:endParaRPr lang="en-US" dirty="0" smtClean="0"/>
           </a:p>
@@ -39718,7 +40425,7 @@
           <a:graphicData uri="http://schemas.openxmlformats.org/presentationml/2006/ole">
             <mc:AlternateContent xmlns:mc="http://schemas.openxmlformats.org/markup-compatibility/2006">
               <mc:Choice xmlns:v="urn:schemas-microsoft-com:vml" Requires="v">
-                <p:oleObj spid="_x0000_s400398" name="Equation" r:id="rId5" imgW="2324100" imgH="1016000" progId="Equation.DSMT4">
+                <p:oleObj spid="_x0000_s400402" name="Equation" r:id="rId5" imgW="2324100" imgH="1016000" progId="Equation.DSMT4">
                   <p:embed/>
                 </p:oleObj>
               </mc:Choice>
@@ -39784,7 +40491,7 @@
 </p:sld>
 </file>
 
-<file path=ppt/slides/slide44.xml><?xml version="1.0" encoding="utf-8"?>
+<file path=ppt/slides/slide45.xml><?xml version="1.0" encoding="utf-8"?>
 <p:sld xmlns:a="http://schemas.openxmlformats.org/drawingml/2006/main" xmlns:r="http://schemas.openxmlformats.org/officeDocument/2006/relationships" xmlns:p="http://schemas.openxmlformats.org/presentationml/2006/main">
   <p:cSld>
     <p:spTree>
@@ -40699,7 +41406,7 @@
                 <a:tabLst/>
                 <a:defRPr/>
               </a:pPr>
-              <a:t>44</a:t>
+              <a:t>45</a:t>
             </a:fld>
             <a:endParaRPr kumimoji="0" lang="en-US" sz="1200" b="0" i="0" u="none" strike="noStrike" kern="1200" cap="none" spc="0" normalizeH="0" baseline="0" noProof="0" dirty="0" smtClean="0">
               <a:ln>
@@ -40768,7 +41475,7 @@
           <a:graphicData uri="http://schemas.openxmlformats.org/presentationml/2006/ole">
             <mc:AlternateContent xmlns:mc="http://schemas.openxmlformats.org/markup-compatibility/2006">
               <mc:Choice xmlns:v="urn:schemas-microsoft-com:vml" Requires="v">
-                <p:oleObj spid="_x0000_s401422" name="Equation" r:id="rId4" imgW="3810000" imgH="1295400" progId="Equation.DSMT4">
+                <p:oleObj spid="_x0000_s401426" name="Equation" r:id="rId4" imgW="3810000" imgH="1295400" progId="Equation.DSMT4">
                   <p:embed/>
                 </p:oleObj>
               </mc:Choice>
@@ -40834,7 +41541,7 @@
 </p:sld>
 </file>
 
-<file path=ppt/slides/slide45.xml><?xml version="1.0" encoding="utf-8"?>
+<file path=ppt/slides/slide46.xml><?xml version="1.0" encoding="utf-8"?>
 <p:sld xmlns:a="http://schemas.openxmlformats.org/drawingml/2006/main" xmlns:r="http://schemas.openxmlformats.org/officeDocument/2006/relationships" xmlns:p="http://schemas.openxmlformats.org/presentationml/2006/main">
   <p:cSld>
     <p:spTree>
@@ -40883,7 +41590,7 @@
             <a:fld id="{CBD9AEC5-2546-4473-B982-5733658B7CFB}" type="slidenum">
               <a:rPr lang="en-US" sz="1200" smtClean="0"/>
               <a:pPr/>
-              <a:t>45</a:t>
+              <a:t>46</a:t>
             </a:fld>
             <a:endParaRPr lang="en-US" sz="1200" dirty="0" smtClean="0"/>
           </a:p>

</xml_diff>